<commit_message>
FINAL DE LA FINAL
EXPOSICION
</commit_message>
<xml_diff>
--- a/ocr-ppt.pptx
+++ b/ocr-ppt.pptx
@@ -5,7 +5,7 @@
     <p:sldMasterId id="2147483696" r:id="rId1"/>
   </p:sldMasterIdLst>
   <p:notesMasterIdLst>
-    <p:notesMasterId r:id="rId33"/>
+    <p:notesMasterId r:id="rId32"/>
   </p:notesMasterIdLst>
   <p:sldIdLst>
     <p:sldId id="256" r:id="rId2"/>
@@ -17,28 +17,27 @@
     <p:sldId id="337" r:id="rId8"/>
     <p:sldId id="340" r:id="rId9"/>
     <p:sldId id="259" r:id="rId10"/>
-    <p:sldId id="338" r:id="rId11"/>
-    <p:sldId id="332" r:id="rId12"/>
-    <p:sldId id="333" r:id="rId13"/>
-    <p:sldId id="335" r:id="rId14"/>
-    <p:sldId id="336" r:id="rId15"/>
-    <p:sldId id="264" r:id="rId16"/>
-    <p:sldId id="343" r:id="rId17"/>
-    <p:sldId id="265" r:id="rId18"/>
-    <p:sldId id="268" r:id="rId19"/>
-    <p:sldId id="269" r:id="rId20"/>
-    <p:sldId id="270" r:id="rId21"/>
-    <p:sldId id="271" r:id="rId22"/>
-    <p:sldId id="339" r:id="rId23"/>
-    <p:sldId id="344" r:id="rId24"/>
-    <p:sldId id="345" r:id="rId25"/>
-    <p:sldId id="346" r:id="rId26"/>
-    <p:sldId id="347" r:id="rId27"/>
-    <p:sldId id="348" r:id="rId28"/>
-    <p:sldId id="349" r:id="rId29"/>
-    <p:sldId id="350" r:id="rId30"/>
-    <p:sldId id="351" r:id="rId31"/>
-    <p:sldId id="288" r:id="rId32"/>
+    <p:sldId id="332" r:id="rId11"/>
+    <p:sldId id="333" r:id="rId12"/>
+    <p:sldId id="335" r:id="rId13"/>
+    <p:sldId id="336" r:id="rId14"/>
+    <p:sldId id="264" r:id="rId15"/>
+    <p:sldId id="343" r:id="rId16"/>
+    <p:sldId id="265" r:id="rId17"/>
+    <p:sldId id="268" r:id="rId18"/>
+    <p:sldId id="269" r:id="rId19"/>
+    <p:sldId id="270" r:id="rId20"/>
+    <p:sldId id="271" r:id="rId21"/>
+    <p:sldId id="339" r:id="rId22"/>
+    <p:sldId id="344" r:id="rId23"/>
+    <p:sldId id="345" r:id="rId24"/>
+    <p:sldId id="346" r:id="rId25"/>
+    <p:sldId id="347" r:id="rId26"/>
+    <p:sldId id="348" r:id="rId27"/>
+    <p:sldId id="349" r:id="rId28"/>
+    <p:sldId id="350" r:id="rId29"/>
+    <p:sldId id="351" r:id="rId30"/>
+    <p:sldId id="288" r:id="rId31"/>
   </p:sldIdLst>
   <p:sldSz cx="9144000" cy="5143500" type="screen16x9"/>
   <p:notesSz cx="6858000" cy="9144000"/>
@@ -845,6 +844,115 @@
   <p:cSld>
     <p:spTree>
       <p:nvGrpSpPr>
+        <p:cNvPr id="1" name="Shape 376"/>
+        <p:cNvGrpSpPr/>
+        <p:nvPr/>
+      </p:nvGrpSpPr>
+      <p:grpSpPr>
+        <a:xfrm>
+          <a:off x="0" y="0"/>
+          <a:ext cx="0" cy="0"/>
+          <a:chOff x="0" y="0"/>
+          <a:chExt cx="0" cy="0"/>
+        </a:xfrm>
+      </p:grpSpPr>
+      <p:sp>
+        <p:nvSpPr>
+          <p:cNvPr id="377" name="Google Shape;377;gb37d1f1062_0_6:notes"/>
+          <p:cNvSpPr>
+            <a:spLocks noGrp="1" noRot="1" noChangeAspect="1"/>
+          </p:cNvSpPr>
+          <p:nvPr>
+            <p:ph type="sldImg" idx="2"/>
+          </p:nvPr>
+        </p:nvSpPr>
+        <p:spPr>
+          <a:xfrm>
+            <a:off x="381000" y="685800"/>
+            <a:ext cx="6096000" cy="3429000"/>
+          </a:xfrm>
+          <a:custGeom>
+            <a:avLst/>
+            <a:gdLst/>
+            <a:ahLst/>
+            <a:cxnLst/>
+            <a:rect l="l" t="t" r="r" b="b"/>
+            <a:pathLst>
+              <a:path w="120000" h="120000" extrusionOk="0">
+                <a:moveTo>
+                  <a:pt x="0" y="0"/>
+                </a:moveTo>
+                <a:lnTo>
+                  <a:pt x="120000" y="0"/>
+                </a:lnTo>
+                <a:lnTo>
+                  <a:pt x="120000" y="120000"/>
+                </a:lnTo>
+                <a:lnTo>
+                  <a:pt x="0" y="120000"/>
+                </a:lnTo>
+                <a:close/>
+              </a:path>
+            </a:pathLst>
+          </a:custGeom>
+        </p:spPr>
+      </p:sp>
+      <p:sp>
+        <p:nvSpPr>
+          <p:cNvPr id="378" name="Google Shape;378;gb37d1f1062_0_6:notes"/>
+          <p:cNvSpPr txBox="1">
+            <a:spLocks noGrp="1"/>
+          </p:cNvSpPr>
+          <p:nvPr>
+            <p:ph type="body" idx="1"/>
+          </p:nvPr>
+        </p:nvSpPr>
+        <p:spPr>
+          <a:xfrm>
+            <a:off x="685800" y="4343400"/>
+            <a:ext cx="5486400" cy="4114800"/>
+          </a:xfrm>
+          <a:prstGeom prst="rect">
+            <a:avLst/>
+          </a:prstGeom>
+        </p:spPr>
+        <p:txBody>
+          <a:bodyPr spcFirstLastPara="1" wrap="square" lIns="91425" tIns="91425" rIns="91425" bIns="91425" anchor="t" anchorCtr="0">
+            <a:noAutofit/>
+          </a:bodyPr>
+          <a:lstStyle/>
+          <a:p>
+            <a:pPr marL="0" lvl="0" indent="0" algn="l" rtl="0">
+              <a:spcBef>
+                <a:spcPts val="0"/>
+              </a:spcBef>
+              <a:spcAft>
+                <a:spcPts val="0"/>
+              </a:spcAft>
+              <a:buNone/>
+            </a:pPr>
+            <a:endParaRPr/>
+          </a:p>
+        </p:txBody>
+      </p:sp>
+    </p:spTree>
+    <p:extLst>
+      <p:ext uri="{BB962C8B-B14F-4D97-AF65-F5344CB8AC3E}">
+        <p14:creationId xmlns:p14="http://schemas.microsoft.com/office/powerpoint/2010/main" val="3540350435"/>
+      </p:ext>
+    </p:extLst>
+  </p:cSld>
+  <p:clrMapOvr>
+    <a:masterClrMapping/>
+  </p:clrMapOvr>
+</p:notes>
+</file>
+
+<file path=ppt/notesSlides/notesSlide11.xml><?xml version="1.0" encoding="utf-8"?>
+<p:notes xmlns:a="http://schemas.openxmlformats.org/drawingml/2006/main" xmlns:r="http://schemas.openxmlformats.org/officeDocument/2006/relationships" xmlns:p="http://schemas.openxmlformats.org/presentationml/2006/main" showMasterSp="0" showMasterPhAnim="0">
+  <p:cSld>
+    <p:spTree>
+      <p:nvGrpSpPr>
         <p:cNvPr id="1" name="Shape 392"/>
         <p:cNvGrpSpPr/>
         <p:nvPr/>
@@ -932,115 +1040,6 @@
               </a:spcAft>
               <a:buNone/>
             </a:pPr>
-            <a:endParaRPr sz="1400" dirty="0"/>
-          </a:p>
-        </p:txBody>
-      </p:sp>
-    </p:spTree>
-    <p:extLst>
-      <p:ext uri="{BB962C8B-B14F-4D97-AF65-F5344CB8AC3E}">
-        <p14:creationId xmlns:p14="http://schemas.microsoft.com/office/powerpoint/2010/main" val="3159113572"/>
-      </p:ext>
-    </p:extLst>
-  </p:cSld>
-  <p:clrMapOvr>
-    <a:masterClrMapping/>
-  </p:clrMapOvr>
-</p:notes>
-</file>
-
-<file path=ppt/notesSlides/notesSlide11.xml><?xml version="1.0" encoding="utf-8"?>
-<p:notes xmlns:a="http://schemas.openxmlformats.org/drawingml/2006/main" xmlns:r="http://schemas.openxmlformats.org/officeDocument/2006/relationships" xmlns:p="http://schemas.openxmlformats.org/presentationml/2006/main" showMasterSp="0" showMasterPhAnim="0">
-  <p:cSld>
-    <p:spTree>
-      <p:nvGrpSpPr>
-        <p:cNvPr id="1" name="Shape 376"/>
-        <p:cNvGrpSpPr/>
-        <p:nvPr/>
-      </p:nvGrpSpPr>
-      <p:grpSpPr>
-        <a:xfrm>
-          <a:off x="0" y="0"/>
-          <a:ext cx="0" cy="0"/>
-          <a:chOff x="0" y="0"/>
-          <a:chExt cx="0" cy="0"/>
-        </a:xfrm>
-      </p:grpSpPr>
-      <p:sp>
-        <p:nvSpPr>
-          <p:cNvPr id="377" name="Google Shape;377;gb37d1f1062_0_6:notes"/>
-          <p:cNvSpPr>
-            <a:spLocks noGrp="1" noRot="1" noChangeAspect="1"/>
-          </p:cNvSpPr>
-          <p:nvPr>
-            <p:ph type="sldImg" idx="2"/>
-          </p:nvPr>
-        </p:nvSpPr>
-        <p:spPr>
-          <a:xfrm>
-            <a:off x="381000" y="685800"/>
-            <a:ext cx="6096000" cy="3429000"/>
-          </a:xfrm>
-          <a:custGeom>
-            <a:avLst/>
-            <a:gdLst/>
-            <a:ahLst/>
-            <a:cxnLst/>
-            <a:rect l="l" t="t" r="r" b="b"/>
-            <a:pathLst>
-              <a:path w="120000" h="120000" extrusionOk="0">
-                <a:moveTo>
-                  <a:pt x="0" y="0"/>
-                </a:moveTo>
-                <a:lnTo>
-                  <a:pt x="120000" y="0"/>
-                </a:lnTo>
-                <a:lnTo>
-                  <a:pt x="120000" y="120000"/>
-                </a:lnTo>
-                <a:lnTo>
-                  <a:pt x="0" y="120000"/>
-                </a:lnTo>
-                <a:close/>
-              </a:path>
-            </a:pathLst>
-          </a:custGeom>
-        </p:spPr>
-      </p:sp>
-      <p:sp>
-        <p:nvSpPr>
-          <p:cNvPr id="378" name="Google Shape;378;gb37d1f1062_0_6:notes"/>
-          <p:cNvSpPr txBox="1">
-            <a:spLocks noGrp="1"/>
-          </p:cNvSpPr>
-          <p:nvPr>
-            <p:ph type="body" idx="1"/>
-          </p:nvPr>
-        </p:nvSpPr>
-        <p:spPr>
-          <a:xfrm>
-            <a:off x="685800" y="4343400"/>
-            <a:ext cx="5486400" cy="4114800"/>
-          </a:xfrm>
-          <a:prstGeom prst="rect">
-            <a:avLst/>
-          </a:prstGeom>
-        </p:spPr>
-        <p:txBody>
-          <a:bodyPr spcFirstLastPara="1" wrap="square" lIns="91425" tIns="91425" rIns="91425" bIns="91425" anchor="t" anchorCtr="0">
-            <a:noAutofit/>
-          </a:bodyPr>
-          <a:lstStyle/>
-          <a:p>
-            <a:pPr marL="0" lvl="0" indent="0" algn="l" rtl="0">
-              <a:spcBef>
-                <a:spcPts val="0"/>
-              </a:spcBef>
-              <a:spcAft>
-                <a:spcPts val="0"/>
-              </a:spcAft>
-              <a:buNone/>
-            </a:pPr>
             <a:endParaRPr/>
           </a:p>
         </p:txBody>
@@ -1048,7 +1047,7 @@
     </p:spTree>
     <p:extLst>
       <p:ext uri="{BB962C8B-B14F-4D97-AF65-F5344CB8AC3E}">
-        <p14:creationId xmlns:p14="http://schemas.microsoft.com/office/powerpoint/2010/main" val="3540350435"/>
+        <p14:creationId xmlns:p14="http://schemas.microsoft.com/office/powerpoint/2010/main" val="3390600540"/>
       </p:ext>
     </p:extLst>
   </p:cSld>
@@ -1157,7 +1156,7 @@
     </p:spTree>
     <p:extLst>
       <p:ext uri="{BB962C8B-B14F-4D97-AF65-F5344CB8AC3E}">
-        <p14:creationId xmlns:p14="http://schemas.microsoft.com/office/powerpoint/2010/main" val="3390600540"/>
+        <p14:creationId xmlns:p14="http://schemas.microsoft.com/office/powerpoint/2010/main" val="2471515927"/>
       </p:ext>
     </p:extLst>
   </p:cSld>
@@ -1168,115 +1167,6 @@
 </file>
 
 <file path=ppt/notesSlides/notesSlide13.xml><?xml version="1.0" encoding="utf-8"?>
-<p:notes xmlns:a="http://schemas.openxmlformats.org/drawingml/2006/main" xmlns:r="http://schemas.openxmlformats.org/officeDocument/2006/relationships" xmlns:p="http://schemas.openxmlformats.org/presentationml/2006/main" showMasterSp="0" showMasterPhAnim="0">
-  <p:cSld>
-    <p:spTree>
-      <p:nvGrpSpPr>
-        <p:cNvPr id="1" name="Shape 392"/>
-        <p:cNvGrpSpPr/>
-        <p:nvPr/>
-      </p:nvGrpSpPr>
-      <p:grpSpPr>
-        <a:xfrm>
-          <a:off x="0" y="0"/>
-          <a:ext cx="0" cy="0"/>
-          <a:chOff x="0" y="0"/>
-          <a:chExt cx="0" cy="0"/>
-        </a:xfrm>
-      </p:grpSpPr>
-      <p:sp>
-        <p:nvSpPr>
-          <p:cNvPr id="393" name="Google Shape;393;g1524e77840e_1_1:notes"/>
-          <p:cNvSpPr>
-            <a:spLocks noGrp="1" noRot="1" noChangeAspect="1"/>
-          </p:cNvSpPr>
-          <p:nvPr>
-            <p:ph type="sldImg" idx="2"/>
-          </p:nvPr>
-        </p:nvSpPr>
-        <p:spPr>
-          <a:xfrm>
-            <a:off x="381000" y="685800"/>
-            <a:ext cx="6096000" cy="3429000"/>
-          </a:xfrm>
-          <a:custGeom>
-            <a:avLst/>
-            <a:gdLst/>
-            <a:ahLst/>
-            <a:cxnLst/>
-            <a:rect l="l" t="t" r="r" b="b"/>
-            <a:pathLst>
-              <a:path w="120000" h="120000" extrusionOk="0">
-                <a:moveTo>
-                  <a:pt x="0" y="0"/>
-                </a:moveTo>
-                <a:lnTo>
-                  <a:pt x="120000" y="0"/>
-                </a:lnTo>
-                <a:lnTo>
-                  <a:pt x="120000" y="120000"/>
-                </a:lnTo>
-                <a:lnTo>
-                  <a:pt x="0" y="120000"/>
-                </a:lnTo>
-                <a:close/>
-              </a:path>
-            </a:pathLst>
-          </a:custGeom>
-        </p:spPr>
-      </p:sp>
-      <p:sp>
-        <p:nvSpPr>
-          <p:cNvPr id="394" name="Google Shape;394;g1524e77840e_1_1:notes"/>
-          <p:cNvSpPr txBox="1">
-            <a:spLocks noGrp="1"/>
-          </p:cNvSpPr>
-          <p:nvPr>
-            <p:ph type="body" idx="1"/>
-          </p:nvPr>
-        </p:nvSpPr>
-        <p:spPr>
-          <a:xfrm>
-            <a:off x="685800" y="4343400"/>
-            <a:ext cx="5486400" cy="4114800"/>
-          </a:xfrm>
-          <a:prstGeom prst="rect">
-            <a:avLst/>
-          </a:prstGeom>
-        </p:spPr>
-        <p:txBody>
-          <a:bodyPr spcFirstLastPara="1" wrap="square" lIns="91425" tIns="91425" rIns="91425" bIns="91425" anchor="t" anchorCtr="0">
-            <a:noAutofit/>
-          </a:bodyPr>
-          <a:lstStyle/>
-          <a:p>
-            <a:pPr marL="0" lvl="0" indent="0" algn="l" rtl="0">
-              <a:spcBef>
-                <a:spcPts val="0"/>
-              </a:spcBef>
-              <a:spcAft>
-                <a:spcPts val="0"/>
-              </a:spcAft>
-              <a:buNone/>
-            </a:pPr>
-            <a:endParaRPr/>
-          </a:p>
-        </p:txBody>
-      </p:sp>
-    </p:spTree>
-    <p:extLst>
-      <p:ext uri="{BB962C8B-B14F-4D97-AF65-F5344CB8AC3E}">
-        <p14:creationId xmlns:p14="http://schemas.microsoft.com/office/powerpoint/2010/main" val="2471515927"/>
-      </p:ext>
-    </p:extLst>
-  </p:cSld>
-  <p:clrMapOvr>
-    <a:masterClrMapping/>
-  </p:clrMapOvr>
-</p:notes>
-</file>
-
-<file path=ppt/notesSlides/notesSlide14.xml><?xml version="1.0" encoding="utf-8"?>
 <p:notes xmlns:a="http://schemas.openxmlformats.org/drawingml/2006/main" xmlns:r="http://schemas.openxmlformats.org/officeDocument/2006/relationships" xmlns:p="http://schemas.openxmlformats.org/presentationml/2006/main" showMasterSp="0" showMasterPhAnim="0">
   <p:cSld>
     <p:spTree>
@@ -1385,7 +1275,7 @@
 </p:notes>
 </file>
 
-<file path=ppt/notesSlides/notesSlide15.xml><?xml version="1.0" encoding="utf-8"?>
+<file path=ppt/notesSlides/notesSlide14.xml><?xml version="1.0" encoding="utf-8"?>
 <p:notes xmlns:a="http://schemas.openxmlformats.org/drawingml/2006/main" xmlns:r="http://schemas.openxmlformats.org/officeDocument/2006/relationships" xmlns:p="http://schemas.openxmlformats.org/presentationml/2006/main" showMasterSp="0" showMasterPhAnim="0">
   <p:cSld>
     <p:spTree>
@@ -1489,7 +1379,7 @@
 </p:notes>
 </file>
 
-<file path=ppt/notesSlides/notesSlide16.xml><?xml version="1.0" encoding="utf-8"?>
+<file path=ppt/notesSlides/notesSlide15.xml><?xml version="1.0" encoding="utf-8"?>
 <p:notes xmlns:a="http://schemas.openxmlformats.org/drawingml/2006/main" xmlns:r="http://schemas.openxmlformats.org/officeDocument/2006/relationships" xmlns:p="http://schemas.openxmlformats.org/presentationml/2006/main" showMasterSp="0" showMasterPhAnim="0">
   <p:cSld>
     <p:spTree>
@@ -1593,7 +1483,7 @@
 </p:notes>
 </file>
 
-<file path=ppt/notesSlides/notesSlide17.xml><?xml version="1.0" encoding="utf-8"?>
+<file path=ppt/notesSlides/notesSlide16.xml><?xml version="1.0" encoding="utf-8"?>
 <p:notes xmlns:a="http://schemas.openxmlformats.org/drawingml/2006/main" xmlns:r="http://schemas.openxmlformats.org/officeDocument/2006/relationships" xmlns:p="http://schemas.openxmlformats.org/presentationml/2006/main" showMasterSp="0" showMasterPhAnim="0">
   <p:cSld>
     <p:spTree>
@@ -1697,7 +1587,7 @@
 </p:notes>
 </file>
 
-<file path=ppt/notesSlides/notesSlide18.xml><?xml version="1.0" encoding="utf-8"?>
+<file path=ppt/notesSlides/notesSlide17.xml><?xml version="1.0" encoding="utf-8"?>
 <p:notes xmlns:a="http://schemas.openxmlformats.org/drawingml/2006/main" xmlns:r="http://schemas.openxmlformats.org/officeDocument/2006/relationships" xmlns:p="http://schemas.openxmlformats.org/presentationml/2006/main" showMasterSp="0" showMasterPhAnim="0">
   <p:cSld>
     <p:spTree>
@@ -1801,7 +1691,7 @@
 </p:notes>
 </file>
 
-<file path=ppt/notesSlides/notesSlide19.xml><?xml version="1.0" encoding="utf-8"?>
+<file path=ppt/notesSlides/notesSlide18.xml><?xml version="1.0" encoding="utf-8"?>
 <p:notes xmlns:a="http://schemas.openxmlformats.org/drawingml/2006/main" xmlns:r="http://schemas.openxmlformats.org/officeDocument/2006/relationships" xmlns:p="http://schemas.openxmlformats.org/presentationml/2006/main" showMasterSp="0" showMasterPhAnim="0">
   <p:cSld>
     <p:spTree>
@@ -1862,6 +1752,110 @@
       <p:sp>
         <p:nvSpPr>
           <p:cNvPr id="567" name="Google Shape;567;g1534c337b14_0_12:notes"/>
+          <p:cNvSpPr txBox="1">
+            <a:spLocks noGrp="1"/>
+          </p:cNvSpPr>
+          <p:nvPr>
+            <p:ph type="body" idx="1"/>
+          </p:nvPr>
+        </p:nvSpPr>
+        <p:spPr>
+          <a:xfrm>
+            <a:off x="685800" y="4343400"/>
+            <a:ext cx="5486400" cy="4114800"/>
+          </a:xfrm>
+          <a:prstGeom prst="rect">
+            <a:avLst/>
+          </a:prstGeom>
+        </p:spPr>
+        <p:txBody>
+          <a:bodyPr spcFirstLastPara="1" wrap="square" lIns="91425" tIns="91425" rIns="91425" bIns="91425" anchor="t" anchorCtr="0">
+            <a:noAutofit/>
+          </a:bodyPr>
+          <a:lstStyle/>
+          <a:p>
+            <a:pPr marL="0" lvl="0" indent="0" algn="l" rtl="0">
+              <a:spcBef>
+                <a:spcPts val="0"/>
+              </a:spcBef>
+              <a:spcAft>
+                <a:spcPts val="0"/>
+              </a:spcAft>
+              <a:buNone/>
+            </a:pPr>
+            <a:endParaRPr/>
+          </a:p>
+        </p:txBody>
+      </p:sp>
+    </p:spTree>
+  </p:cSld>
+  <p:clrMapOvr>
+    <a:masterClrMapping/>
+  </p:clrMapOvr>
+</p:notes>
+</file>
+
+<file path=ppt/notesSlides/notesSlide19.xml><?xml version="1.0" encoding="utf-8"?>
+<p:notes xmlns:a="http://schemas.openxmlformats.org/drawingml/2006/main" xmlns:r="http://schemas.openxmlformats.org/officeDocument/2006/relationships" xmlns:p="http://schemas.openxmlformats.org/presentationml/2006/main" showMasterSp="0" showMasterPhAnim="0">
+  <p:cSld>
+    <p:spTree>
+      <p:nvGrpSpPr>
+        <p:cNvPr id="1" name="Shape 584"/>
+        <p:cNvGrpSpPr/>
+        <p:nvPr/>
+      </p:nvGrpSpPr>
+      <p:grpSpPr>
+        <a:xfrm>
+          <a:off x="0" y="0"/>
+          <a:ext cx="0" cy="0"/>
+          <a:chOff x="0" y="0"/>
+          <a:chExt cx="0" cy="0"/>
+        </a:xfrm>
+      </p:grpSpPr>
+      <p:sp>
+        <p:nvSpPr>
+          <p:cNvPr id="585" name="Google Shape;585;gb37d1f1062_0_85:notes"/>
+          <p:cNvSpPr>
+            <a:spLocks noGrp="1" noRot="1" noChangeAspect="1"/>
+          </p:cNvSpPr>
+          <p:nvPr>
+            <p:ph type="sldImg" idx="2"/>
+          </p:nvPr>
+        </p:nvSpPr>
+        <p:spPr>
+          <a:xfrm>
+            <a:off x="381000" y="685800"/>
+            <a:ext cx="6096000" cy="3429000"/>
+          </a:xfrm>
+          <a:custGeom>
+            <a:avLst/>
+            <a:gdLst/>
+            <a:ahLst/>
+            <a:cxnLst/>
+            <a:rect l="l" t="t" r="r" b="b"/>
+            <a:pathLst>
+              <a:path w="120000" h="120000" extrusionOk="0">
+                <a:moveTo>
+                  <a:pt x="0" y="0"/>
+                </a:moveTo>
+                <a:lnTo>
+                  <a:pt x="120000" y="0"/>
+                </a:lnTo>
+                <a:lnTo>
+                  <a:pt x="120000" y="120000"/>
+                </a:lnTo>
+                <a:lnTo>
+                  <a:pt x="0" y="120000"/>
+                </a:lnTo>
+                <a:close/>
+              </a:path>
+            </a:pathLst>
+          </a:custGeom>
+        </p:spPr>
+      </p:sp>
+      <p:sp>
+        <p:nvSpPr>
+          <p:cNvPr id="586" name="Google Shape;586;gb37d1f1062_0_85:notes"/>
           <p:cNvSpPr txBox="1">
             <a:spLocks noGrp="1"/>
           </p:cNvSpPr>
@@ -2010,110 +2004,6 @@
 </file>
 
 <file path=ppt/notesSlides/notesSlide20.xml><?xml version="1.0" encoding="utf-8"?>
-<p:notes xmlns:a="http://schemas.openxmlformats.org/drawingml/2006/main" xmlns:r="http://schemas.openxmlformats.org/officeDocument/2006/relationships" xmlns:p="http://schemas.openxmlformats.org/presentationml/2006/main" showMasterSp="0" showMasterPhAnim="0">
-  <p:cSld>
-    <p:spTree>
-      <p:nvGrpSpPr>
-        <p:cNvPr id="1" name="Shape 584"/>
-        <p:cNvGrpSpPr/>
-        <p:nvPr/>
-      </p:nvGrpSpPr>
-      <p:grpSpPr>
-        <a:xfrm>
-          <a:off x="0" y="0"/>
-          <a:ext cx="0" cy="0"/>
-          <a:chOff x="0" y="0"/>
-          <a:chExt cx="0" cy="0"/>
-        </a:xfrm>
-      </p:grpSpPr>
-      <p:sp>
-        <p:nvSpPr>
-          <p:cNvPr id="585" name="Google Shape;585;gb37d1f1062_0_85:notes"/>
-          <p:cNvSpPr>
-            <a:spLocks noGrp="1" noRot="1" noChangeAspect="1"/>
-          </p:cNvSpPr>
-          <p:nvPr>
-            <p:ph type="sldImg" idx="2"/>
-          </p:nvPr>
-        </p:nvSpPr>
-        <p:spPr>
-          <a:xfrm>
-            <a:off x="381000" y="685800"/>
-            <a:ext cx="6096000" cy="3429000"/>
-          </a:xfrm>
-          <a:custGeom>
-            <a:avLst/>
-            <a:gdLst/>
-            <a:ahLst/>
-            <a:cxnLst/>
-            <a:rect l="l" t="t" r="r" b="b"/>
-            <a:pathLst>
-              <a:path w="120000" h="120000" extrusionOk="0">
-                <a:moveTo>
-                  <a:pt x="0" y="0"/>
-                </a:moveTo>
-                <a:lnTo>
-                  <a:pt x="120000" y="0"/>
-                </a:lnTo>
-                <a:lnTo>
-                  <a:pt x="120000" y="120000"/>
-                </a:lnTo>
-                <a:lnTo>
-                  <a:pt x="0" y="120000"/>
-                </a:lnTo>
-                <a:close/>
-              </a:path>
-            </a:pathLst>
-          </a:custGeom>
-        </p:spPr>
-      </p:sp>
-      <p:sp>
-        <p:nvSpPr>
-          <p:cNvPr id="586" name="Google Shape;586;gb37d1f1062_0_85:notes"/>
-          <p:cNvSpPr txBox="1">
-            <a:spLocks noGrp="1"/>
-          </p:cNvSpPr>
-          <p:nvPr>
-            <p:ph type="body" idx="1"/>
-          </p:nvPr>
-        </p:nvSpPr>
-        <p:spPr>
-          <a:xfrm>
-            <a:off x="685800" y="4343400"/>
-            <a:ext cx="5486400" cy="4114800"/>
-          </a:xfrm>
-          <a:prstGeom prst="rect">
-            <a:avLst/>
-          </a:prstGeom>
-        </p:spPr>
-        <p:txBody>
-          <a:bodyPr spcFirstLastPara="1" wrap="square" lIns="91425" tIns="91425" rIns="91425" bIns="91425" anchor="t" anchorCtr="0">
-            <a:noAutofit/>
-          </a:bodyPr>
-          <a:lstStyle/>
-          <a:p>
-            <a:pPr marL="0" lvl="0" indent="0" algn="l" rtl="0">
-              <a:spcBef>
-                <a:spcPts val="0"/>
-              </a:spcBef>
-              <a:spcAft>
-                <a:spcPts val="0"/>
-              </a:spcAft>
-              <a:buNone/>
-            </a:pPr>
-            <a:endParaRPr/>
-          </a:p>
-        </p:txBody>
-      </p:sp>
-    </p:spTree>
-  </p:cSld>
-  <p:clrMapOvr>
-    <a:masterClrMapping/>
-  </p:clrMapOvr>
-</p:notes>
-</file>
-
-<file path=ppt/notesSlides/notesSlide21.xml><?xml version="1.0" encoding="utf-8"?>
 <p:notes xmlns:a="http://schemas.openxmlformats.org/drawingml/2006/main" xmlns:r="http://schemas.openxmlformats.org/officeDocument/2006/relationships" xmlns:p="http://schemas.openxmlformats.org/presentationml/2006/main" showMasterSp="0" showMasterPhAnim="0">
   <p:cSld>
     <p:spTree>
@@ -18219,18 +18109,9 @@
   <p:clrMapOvr>
     <a:masterClrMapping/>
   </p:clrMapOvr>
-  <mc:AlternateContent xmlns:mc="http://schemas.openxmlformats.org/markup-compatibility/2006" xmlns:p14="http://schemas.microsoft.com/office/powerpoint/2010/main">
-    <mc:Choice Requires="p14">
-      <p:transition spd="slow">
-        <p:push/>
-      </p:transition>
-    </mc:Choice>
-    <mc:Fallback xmlns:ahyp="http://schemas.microsoft.com/office/drawing/2018/hyperlinkcolor" xmlns:p15="http://schemas.microsoft.com/office/powerpoint/2012/main" xmlns:com="http://schemas.openxmlformats.org/drawingml/2006/compatibility" xmlns:pvml="urn:schemas-microsoft-com:office:powerpoint" xmlns:v="urn:schemas-microsoft-com:vml" xmlns:o="urn:schemas-microsoft-com:office:office" xmlns:dgm="http://schemas.openxmlformats.org/drawingml/2006/diagram" xmlns:c="http://schemas.openxmlformats.org/drawingml/2006/chart" xmlns:mv="urn:schemas-microsoft-com:mac:vml" xmlns="">
-      <p:transition spd="slow">
-        <p:fade/>
-      </p:transition>
-    </mc:Fallback>
-  </mc:AlternateContent>
+  <p:transition spd="slow">
+    <p:wipe/>
+  </p:transition>
   <p:timing>
     <p:tnLst>
       <p:par>
@@ -18318,483 +18199,6 @@
 </file>
 
 <file path=ppt/slides/slide10.xml><?xml version="1.0" encoding="utf-8"?>
-<p:sld xmlns:a="http://schemas.openxmlformats.org/drawingml/2006/main" xmlns:r="http://schemas.openxmlformats.org/officeDocument/2006/relationships" xmlns:p="http://schemas.openxmlformats.org/presentationml/2006/main">
-  <p:cSld>
-    <p:spTree>
-      <p:nvGrpSpPr>
-        <p:cNvPr id="1" name="Shape 395"/>
-        <p:cNvGrpSpPr/>
-        <p:nvPr/>
-      </p:nvGrpSpPr>
-      <p:grpSpPr>
-        <a:xfrm>
-          <a:off x="0" y="0"/>
-          <a:ext cx="0" cy="0"/>
-          <a:chOff x="0" y="0"/>
-          <a:chExt cx="0" cy="0"/>
-        </a:xfrm>
-      </p:grpSpPr>
-      <p:sp>
-        <p:nvSpPr>
-          <p:cNvPr id="396" name="Google Shape;396;p56">
-            <a:hlinkClick r:id="rId3" action="ppaction://hlinksldjump"/>
-          </p:cNvPr>
-          <p:cNvSpPr txBox="1">
-            <a:spLocks noGrp="1"/>
-          </p:cNvSpPr>
-          <p:nvPr>
-            <p:ph type="title"/>
-          </p:nvPr>
-        </p:nvSpPr>
-        <p:spPr>
-          <a:xfrm>
-            <a:off x="2019095" y="192851"/>
-            <a:ext cx="5705281" cy="484800"/>
-          </a:xfrm>
-          <a:prstGeom prst="rect">
-            <a:avLst/>
-          </a:prstGeom>
-        </p:spPr>
-        <p:txBody>
-          <a:bodyPr spcFirstLastPara="1" wrap="square" lIns="91425" tIns="91425" rIns="91425" bIns="91425" anchor="b" anchorCtr="0">
-            <a:noAutofit/>
-          </a:bodyPr>
-          <a:lstStyle/>
-          <a:p>
-            <a:pPr marL="0" lvl="0" indent="0" algn="l" rtl="0">
-              <a:spcBef>
-                <a:spcPts val="0"/>
-              </a:spcBef>
-              <a:spcAft>
-                <a:spcPts val="0"/>
-              </a:spcAft>
-              <a:buNone/>
-            </a:pPr>
-            <a:r>
-              <a:rPr lang="es-SV" sz="2400" b="1" dirty="0">
-                <a:latin typeface="Montserrat ExtraBold" panose="00000900000000000000" pitchFamily="2" charset="0"/>
-              </a:rPr>
-              <a:t>PLANTEAMIENTO DEL PROBLEMA</a:t>
-            </a:r>
-          </a:p>
-        </p:txBody>
-      </p:sp>
-      <p:sp>
-        <p:nvSpPr>
-          <p:cNvPr id="4" name="Rectángulo: esquinas redondeadas 3">
-            <a:extLst>
-              <a:ext uri="{FF2B5EF4-FFF2-40B4-BE49-F238E27FC236}">
-                <a16:creationId xmlns:a16="http://schemas.microsoft.com/office/drawing/2014/main" id="{40788561-7922-AF5A-D17E-0317E6F8FBF1}"/>
-              </a:ext>
-            </a:extLst>
-          </p:cNvPr>
-          <p:cNvSpPr/>
-          <p:nvPr/>
-        </p:nvSpPr>
-        <p:spPr>
-          <a:xfrm>
-            <a:off x="3982752" y="1227176"/>
-            <a:ext cx="1777968" cy="3107765"/>
-          </a:xfrm>
-          <a:prstGeom prst="roundRect">
-            <a:avLst/>
-          </a:prstGeom>
-        </p:spPr>
-        <p:style>
-          <a:lnRef idx="3">
-            <a:schemeClr val="lt1"/>
-          </a:lnRef>
-          <a:fillRef idx="1">
-            <a:schemeClr val="accent3"/>
-          </a:fillRef>
-          <a:effectRef idx="1">
-            <a:schemeClr val="accent3"/>
-          </a:effectRef>
-          <a:fontRef idx="minor">
-            <a:schemeClr val="lt1"/>
-          </a:fontRef>
-        </p:style>
-        <p:txBody>
-          <a:bodyPr rtlCol="0" anchor="ctr"/>
-          <a:lstStyle/>
-          <a:p>
-            <a:pPr algn="ctr"/>
-            <a:endParaRPr lang="es-SV">
-              <a:latin typeface="Montserrat Medium" panose="00000600000000000000" pitchFamily="2" charset="0"/>
-            </a:endParaRPr>
-          </a:p>
-        </p:txBody>
-      </p:sp>
-      <p:sp>
-        <p:nvSpPr>
-          <p:cNvPr id="6" name="CuadroTexto 5">
-            <a:extLst>
-              <a:ext uri="{FF2B5EF4-FFF2-40B4-BE49-F238E27FC236}">
-                <a16:creationId xmlns:a16="http://schemas.microsoft.com/office/drawing/2014/main" id="{1BD05404-C98A-0DCC-785C-9CD38B5B4117}"/>
-              </a:ext>
-            </a:extLst>
-          </p:cNvPr>
-          <p:cNvSpPr txBox="1"/>
-          <p:nvPr/>
-        </p:nvSpPr>
-        <p:spPr>
-          <a:xfrm>
-            <a:off x="299736" y="1333607"/>
-            <a:ext cx="3383280" cy="3374642"/>
-          </a:xfrm>
-          <a:prstGeom prst="rect">
-            <a:avLst/>
-          </a:prstGeom>
-          <a:noFill/>
-        </p:spPr>
-        <p:txBody>
-          <a:bodyPr wrap="square">
-            <a:spAutoFit/>
-          </a:bodyPr>
-          <a:lstStyle/>
-          <a:p>
-            <a:pPr marL="285750" indent="-285750">
-              <a:lnSpc>
-                <a:spcPct val="150000"/>
-              </a:lnSpc>
-              <a:buFont typeface="Arial" panose="020B0604020202020204" pitchFamily="34" charset="0"/>
-              <a:buChar char="•"/>
-            </a:pPr>
-            <a:r>
-              <a:rPr lang="es-SV" sz="1600" dirty="0">
-                <a:latin typeface="Montserrat Medium" panose="00000600000000000000" pitchFamily="2" charset="0"/>
-              </a:rPr>
-              <a:t>Demora al realizar búsquedas o consultas de documentos</a:t>
-            </a:r>
-          </a:p>
-          <a:p>
-            <a:pPr marL="285750" indent="-285750">
-              <a:lnSpc>
-                <a:spcPct val="150000"/>
-              </a:lnSpc>
-              <a:buFont typeface="Arial" panose="020B0604020202020204" pitchFamily="34" charset="0"/>
-              <a:buChar char="•"/>
-            </a:pPr>
-            <a:r>
-              <a:rPr lang="es-SV" sz="1600" dirty="0">
-                <a:latin typeface="Montserrat Medium" panose="00000600000000000000" pitchFamily="2" charset="0"/>
-              </a:rPr>
-              <a:t>Duplicidad en los archivos</a:t>
-            </a:r>
-          </a:p>
-          <a:p>
-            <a:pPr marL="285750" indent="-285750">
-              <a:lnSpc>
-                <a:spcPct val="150000"/>
-              </a:lnSpc>
-              <a:buFont typeface="Arial" panose="020B0604020202020204" pitchFamily="34" charset="0"/>
-              <a:buChar char="•"/>
-            </a:pPr>
-            <a:r>
-              <a:rPr lang="es-SV" sz="1600" dirty="0">
-                <a:latin typeface="Montserrat Medium" panose="00000600000000000000" pitchFamily="2" charset="0"/>
-              </a:rPr>
-              <a:t>Gastos en concepto de Papelería</a:t>
-            </a:r>
-          </a:p>
-          <a:p>
-            <a:pPr marL="285750" indent="-285750">
-              <a:lnSpc>
-                <a:spcPct val="150000"/>
-              </a:lnSpc>
-              <a:buFont typeface="Arial" panose="020B0604020202020204" pitchFamily="34" charset="0"/>
-              <a:buChar char="•"/>
-            </a:pPr>
-            <a:r>
-              <a:rPr lang="es-SV" sz="1600" dirty="0">
-                <a:latin typeface="Montserrat Medium" panose="00000600000000000000" pitchFamily="2" charset="0"/>
-              </a:rPr>
-              <a:t>Retraso en procesos debido a gestión manual de documentos físicos</a:t>
-            </a:r>
-          </a:p>
-        </p:txBody>
-      </p:sp>
-      <p:sp>
-        <p:nvSpPr>
-          <p:cNvPr id="7" name="CuadroTexto 6">
-            <a:extLst>
-              <a:ext uri="{FF2B5EF4-FFF2-40B4-BE49-F238E27FC236}">
-                <a16:creationId xmlns:a16="http://schemas.microsoft.com/office/drawing/2014/main" id="{EE8FBD00-4BA1-EC8D-6DCA-AFFE79EA25EE}"/>
-              </a:ext>
-            </a:extLst>
-          </p:cNvPr>
-          <p:cNvSpPr txBox="1"/>
-          <p:nvPr/>
-        </p:nvSpPr>
-        <p:spPr>
-          <a:xfrm>
-            <a:off x="5760720" y="1440414"/>
-            <a:ext cx="3383280" cy="3005310"/>
-          </a:xfrm>
-          <a:prstGeom prst="rect">
-            <a:avLst/>
-          </a:prstGeom>
-          <a:noFill/>
-        </p:spPr>
-        <p:txBody>
-          <a:bodyPr wrap="square">
-            <a:spAutoFit/>
-          </a:bodyPr>
-          <a:lstStyle/>
-          <a:p>
-            <a:pPr marL="285750" indent="-285750">
-              <a:lnSpc>
-                <a:spcPct val="150000"/>
-              </a:lnSpc>
-              <a:buFont typeface="Arial" panose="020B0604020202020204" pitchFamily="34" charset="0"/>
-              <a:buChar char="•"/>
-            </a:pPr>
-            <a:r>
-              <a:rPr lang="es-SV" sz="1600" dirty="0">
-                <a:latin typeface="Montserrat Medium" panose="00000600000000000000" pitchFamily="2" charset="0"/>
-              </a:rPr>
-              <a:t>Disponibilidad de la información</a:t>
-            </a:r>
-          </a:p>
-          <a:p>
-            <a:pPr marL="285750" indent="-285750">
-              <a:lnSpc>
-                <a:spcPct val="150000"/>
-              </a:lnSpc>
-              <a:buFont typeface="Arial" panose="020B0604020202020204" pitchFamily="34" charset="0"/>
-              <a:buChar char="•"/>
-            </a:pPr>
-            <a:r>
-              <a:rPr lang="es-SV" sz="1600" dirty="0">
-                <a:latin typeface="Montserrat Medium" panose="00000600000000000000" pitchFamily="2" charset="0"/>
-              </a:rPr>
-              <a:t>Reducción de Costos y manejo optimo de recursos </a:t>
-            </a:r>
-          </a:p>
-          <a:p>
-            <a:pPr marL="285750" indent="-285750">
-              <a:lnSpc>
-                <a:spcPct val="150000"/>
-              </a:lnSpc>
-              <a:buFont typeface="Arial" panose="020B0604020202020204" pitchFamily="34" charset="0"/>
-              <a:buChar char="•"/>
-            </a:pPr>
-            <a:r>
-              <a:rPr lang="es-SV" sz="1600" dirty="0">
-                <a:latin typeface="Montserrat Medium" panose="00000600000000000000" pitchFamily="2" charset="0"/>
-              </a:rPr>
-              <a:t>Búsqueda de la mejora continua</a:t>
-            </a:r>
-          </a:p>
-          <a:p>
-            <a:pPr marL="285750" indent="-285750">
-              <a:lnSpc>
-                <a:spcPct val="150000"/>
-              </a:lnSpc>
-              <a:buFont typeface="Arial" panose="020B0604020202020204" pitchFamily="34" charset="0"/>
-              <a:buChar char="•"/>
-            </a:pPr>
-            <a:r>
-              <a:rPr lang="es-SV" sz="1600" dirty="0">
-                <a:latin typeface="Montserrat Medium" panose="00000600000000000000" pitchFamily="2" charset="0"/>
-              </a:rPr>
-              <a:t>Reducción de tiempos de atención</a:t>
-            </a:r>
-          </a:p>
-        </p:txBody>
-      </p:sp>
-      <p:sp>
-        <p:nvSpPr>
-          <p:cNvPr id="8" name="Flecha: a la derecha 7">
-            <a:extLst>
-              <a:ext uri="{FF2B5EF4-FFF2-40B4-BE49-F238E27FC236}">
-                <a16:creationId xmlns:a16="http://schemas.microsoft.com/office/drawing/2014/main" id="{2AA69594-0C08-24CE-D5EC-4009F7AAADB3}"/>
-              </a:ext>
-            </a:extLst>
-          </p:cNvPr>
-          <p:cNvSpPr/>
-          <p:nvPr/>
-        </p:nvSpPr>
-        <p:spPr>
-          <a:xfrm>
-            <a:off x="1724298" y="900740"/>
-            <a:ext cx="1358537" cy="288578"/>
-          </a:xfrm>
-          <a:prstGeom prst="rightArrow">
-            <a:avLst/>
-          </a:prstGeom>
-        </p:spPr>
-        <p:style>
-          <a:lnRef idx="3">
-            <a:schemeClr val="lt1"/>
-          </a:lnRef>
-          <a:fillRef idx="1">
-            <a:schemeClr val="accent3"/>
-          </a:fillRef>
-          <a:effectRef idx="1">
-            <a:schemeClr val="accent3"/>
-          </a:effectRef>
-          <a:fontRef idx="minor">
-            <a:schemeClr val="lt1"/>
-          </a:fontRef>
-        </p:style>
-        <p:txBody>
-          <a:bodyPr rtlCol="0" anchor="ctr"/>
-          <a:lstStyle/>
-          <a:p>
-            <a:pPr algn="ctr"/>
-            <a:endParaRPr lang="es-SV">
-              <a:latin typeface="Montserrat Medium" panose="00000600000000000000" pitchFamily="2" charset="0"/>
-            </a:endParaRPr>
-          </a:p>
-        </p:txBody>
-      </p:sp>
-      <p:sp>
-        <p:nvSpPr>
-          <p:cNvPr id="9" name="Flecha: a la derecha 8">
-            <a:extLst>
-              <a:ext uri="{FF2B5EF4-FFF2-40B4-BE49-F238E27FC236}">
-                <a16:creationId xmlns:a16="http://schemas.microsoft.com/office/drawing/2014/main" id="{AAC67C88-F54E-9B32-A914-901197240CEE}"/>
-              </a:ext>
-            </a:extLst>
-          </p:cNvPr>
-          <p:cNvSpPr/>
-          <p:nvPr/>
-        </p:nvSpPr>
-        <p:spPr>
-          <a:xfrm>
-            <a:off x="6740434" y="900740"/>
-            <a:ext cx="1358537" cy="288578"/>
-          </a:xfrm>
-          <a:prstGeom prst="rightArrow">
-            <a:avLst/>
-          </a:prstGeom>
-        </p:spPr>
-        <p:style>
-          <a:lnRef idx="3">
-            <a:schemeClr val="lt1"/>
-          </a:lnRef>
-          <a:fillRef idx="1">
-            <a:schemeClr val="accent3"/>
-          </a:fillRef>
-          <a:effectRef idx="1">
-            <a:schemeClr val="accent3"/>
-          </a:effectRef>
-          <a:fontRef idx="minor">
-            <a:schemeClr val="lt1"/>
-          </a:fontRef>
-        </p:style>
-        <p:txBody>
-          <a:bodyPr rtlCol="0" anchor="ctr"/>
-          <a:lstStyle/>
-          <a:p>
-            <a:pPr algn="ctr"/>
-            <a:endParaRPr lang="es-SV">
-              <a:latin typeface="Montserrat Medium" panose="00000600000000000000" pitchFamily="2" charset="0"/>
-            </a:endParaRPr>
-          </a:p>
-        </p:txBody>
-      </p:sp>
-    </p:spTree>
-    <p:extLst>
-      <p:ext uri="{BB962C8B-B14F-4D97-AF65-F5344CB8AC3E}">
-        <p14:creationId xmlns:p14="http://schemas.microsoft.com/office/powerpoint/2010/main" val="417111405"/>
-      </p:ext>
-    </p:extLst>
-  </p:cSld>
-  <p:clrMapOvr>
-    <a:masterClrMapping/>
-  </p:clrMapOvr>
-  <p:transition spd="slow">
-    <p:push/>
-  </p:transition>
-  <p:timing>
-    <p:tnLst>
-      <p:par>
-        <p:cTn id="1" dur="indefinite" restart="never" nodeType="tmRoot">
-          <p:childTnLst>
-            <p:seq concurrent="1" nextAc="seek">
-              <p:cTn id="2" dur="indefinite" nodeType="mainSeq">
-                <p:childTnLst>
-                  <p:par>
-                    <p:cTn id="3" fill="hold">
-                      <p:stCondLst>
-                        <p:cond delay="indefinite"/>
-                      </p:stCondLst>
-                      <p:childTnLst>
-                        <p:par>
-                          <p:cTn id="4" fill="hold">
-                            <p:stCondLst>
-                              <p:cond delay="0"/>
-                            </p:stCondLst>
-                            <p:childTnLst>
-                              <p:par>
-                                <p:cTn id="5" presetID="10" presetClass="entr" presetSubtype="0" fill="hold" nodeType="clickEffect">
-                                  <p:stCondLst>
-                                    <p:cond delay="0"/>
-                                  </p:stCondLst>
-                                  <p:childTnLst>
-                                    <p:set>
-                                      <p:cBhvr>
-                                        <p:cTn id="6" dur="1" fill="hold">
-                                          <p:stCondLst>
-                                            <p:cond delay="0"/>
-                                          </p:stCondLst>
-                                        </p:cTn>
-                                        <p:tgtEl>
-                                          <p:spTgt spid="396"/>
-                                        </p:tgtEl>
-                                        <p:attrNameLst>
-                                          <p:attrName>style.visibility</p:attrName>
-                                        </p:attrNameLst>
-                                      </p:cBhvr>
-                                      <p:to>
-                                        <p:strVal val="visible"/>
-                                      </p:to>
-                                    </p:set>
-                                    <p:animEffect transition="in" filter="fade">
-                                      <p:cBhvr>
-                                        <p:cTn id="7" dur="1000"/>
-                                        <p:tgtEl>
-                                          <p:spTgt spid="396"/>
-                                        </p:tgtEl>
-                                      </p:cBhvr>
-                                    </p:animEffect>
-                                  </p:childTnLst>
-                                </p:cTn>
-                              </p:par>
-                            </p:childTnLst>
-                          </p:cTn>
-                        </p:par>
-                      </p:childTnLst>
-                    </p:cTn>
-                  </p:par>
-                </p:childTnLst>
-              </p:cTn>
-              <p:prevCondLst>
-                <p:cond evt="onPrev" delay="0">
-                  <p:tgtEl>
-                    <p:sldTgt/>
-                  </p:tgtEl>
-                </p:cond>
-              </p:prevCondLst>
-              <p:nextCondLst>
-                <p:cond evt="onNext" delay="0">
-                  <p:tgtEl>
-                    <p:sldTgt/>
-                  </p:tgtEl>
-                </p:cond>
-              </p:nextCondLst>
-            </p:seq>
-          </p:childTnLst>
-        </p:cTn>
-      </p:par>
-    </p:tnLst>
-  </p:timing>
-</p:sld>
-</file>
-
-<file path=ppt/slides/slide11.xml><?xml version="1.0" encoding="utf-8"?>
 <p:sld xmlns:a="http://schemas.openxmlformats.org/drawingml/2006/main" xmlns:r="http://schemas.openxmlformats.org/officeDocument/2006/relationships" xmlns:p="http://schemas.openxmlformats.org/presentationml/2006/main">
   <p:cSld>
     <p:spTree>
@@ -19855,7 +19259,7 @@
         <p:push/>
       </p:transition>
     </mc:Choice>
-    <mc:Fallback xmlns:ahyp="http://schemas.microsoft.com/office/drawing/2018/hyperlinkcolor" xmlns:p15="http://schemas.microsoft.com/office/powerpoint/2012/main" xmlns:com="http://schemas.openxmlformats.org/drawingml/2006/compatibility" xmlns:pvml="urn:schemas-microsoft-com:office:powerpoint" xmlns:v="urn:schemas-microsoft-com:vml" xmlns:o="urn:schemas-microsoft-com:office:office" xmlns:dgm="http://schemas.openxmlformats.org/drawingml/2006/diagram" xmlns:c="http://schemas.openxmlformats.org/drawingml/2006/chart" xmlns:mv="urn:schemas-microsoft-com:mac:vml" xmlns="">
+    <mc:Fallback xmlns="" xmlns:mv="urn:schemas-microsoft-com:mac:vml" xmlns:c="http://schemas.openxmlformats.org/drawingml/2006/chart" xmlns:dgm="http://schemas.openxmlformats.org/drawingml/2006/diagram" xmlns:o="urn:schemas-microsoft-com:office:office" xmlns:v="urn:schemas-microsoft-com:vml" xmlns:pvml="urn:schemas-microsoft-com:office:powerpoint" xmlns:com="http://schemas.openxmlformats.org/drawingml/2006/compatibility" xmlns:p15="http://schemas.microsoft.com/office/powerpoint/2012/main" xmlns:ahyp="http://schemas.microsoft.com/office/drawing/2018/hyperlinkcolor">
       <p:transition spd="slow">
         <p:fade/>
       </p:transition>
@@ -19947,7 +19351,7 @@
 </p:sld>
 </file>
 
-<file path=ppt/slides/slide12.xml><?xml version="1.0" encoding="utf-8"?>
+<file path=ppt/slides/slide11.xml><?xml version="1.0" encoding="utf-8"?>
 <p:sld xmlns:a="http://schemas.openxmlformats.org/drawingml/2006/main" xmlns:r="http://schemas.openxmlformats.org/officeDocument/2006/relationships" xmlns:p="http://schemas.openxmlformats.org/presentationml/2006/main">
   <p:cSld>
     <p:spTree>
@@ -20138,7 +19542,7 @@
                 <a:ea typeface="Times New Roman" panose="02020603050405020304" pitchFamily="18" charset="0"/>
                 <a:cs typeface="Times New Roman" panose="02020603050405020304" pitchFamily="18" charset="0"/>
               </a:rPr>
-              <a:t>El desarrollo del proyecto se llevará a cabo en el primer semestre del año 2024 y el segundo semestre del año 2024, comprendido entre el 2 de enero del año 2024 y el 31 de agosto del año 2024.</a:t>
+              <a:t>El desarrollo del proyecto se llevará a cabo en el primer semestre del año 2024 y el segundo semestre del año 2024, comprendido entre el 16 de enero del año 2024 y el 30 de agosto del año 2024.</a:t>
             </a:r>
           </a:p>
         </p:txBody>
@@ -20183,7 +19587,7 @@
                 <a:ea typeface="Times New Roman" panose="02020603050405020304" pitchFamily="18" charset="0"/>
                 <a:cs typeface="Times New Roman" panose="02020603050405020304" pitchFamily="18" charset="0"/>
               </a:rPr>
-              <a:t>El proyecto será desarrollado para el bufete de abogados Cartagena, el cual se encuentra ubicado en el bulevar tutunichapa 7ª av. norte.  </a:t>
+              <a:t>El proyecto será desarrollado para el bufete de abogados Cartagena, el cual se encuentra ubicado en el bulevar tutunichapa 7ª av. norte. Local 2C. </a:t>
             </a:r>
           </a:p>
         </p:txBody>
@@ -20308,7 +19712,7 @@
         <p:push/>
       </p:transition>
     </mc:Choice>
-    <mc:Fallback xmlns:ahyp="http://schemas.microsoft.com/office/drawing/2018/hyperlinkcolor" xmlns:p15="http://schemas.microsoft.com/office/powerpoint/2012/main" xmlns:com="http://schemas.openxmlformats.org/drawingml/2006/compatibility" xmlns:pvml="urn:schemas-microsoft-com:office:powerpoint" xmlns:v="urn:schemas-microsoft-com:vml" xmlns:o="urn:schemas-microsoft-com:office:office" xmlns:dgm="http://schemas.openxmlformats.org/drawingml/2006/diagram" xmlns:c="http://schemas.openxmlformats.org/drawingml/2006/chart" xmlns:mv="urn:schemas-microsoft-com:mac:vml" xmlns="">
+    <mc:Fallback xmlns="" xmlns:mv="urn:schemas-microsoft-com:mac:vml" xmlns:c="http://schemas.openxmlformats.org/drawingml/2006/chart" xmlns:dgm="http://schemas.openxmlformats.org/drawingml/2006/diagram" xmlns:o="urn:schemas-microsoft-com:office:office" xmlns:v="urn:schemas-microsoft-com:vml" xmlns:pvml="urn:schemas-microsoft-com:office:powerpoint" xmlns:com="http://schemas.openxmlformats.org/drawingml/2006/compatibility" xmlns:p15="http://schemas.microsoft.com/office/powerpoint/2012/main" xmlns:ahyp="http://schemas.microsoft.com/office/drawing/2018/hyperlinkcolor">
       <p:transition spd="slow">
         <p:fade/>
       </p:transition>
@@ -20400,7 +19804,7 @@
 </p:sld>
 </file>
 
-<file path=ppt/slides/slide13.xml><?xml version="1.0" encoding="utf-8"?>
+<file path=ppt/slides/slide12.xml><?xml version="1.0" encoding="utf-8"?>
 <p:sld xmlns:a="http://schemas.openxmlformats.org/drawingml/2006/main" xmlns:r="http://schemas.openxmlformats.org/officeDocument/2006/relationships" xmlns:p="http://schemas.openxmlformats.org/presentationml/2006/main">
   <p:cSld>
     <p:spTree>
@@ -20699,7 +20103,7 @@
         <p:push/>
       </p:transition>
     </mc:Choice>
-    <mc:Fallback xmlns:ahyp="http://schemas.microsoft.com/office/drawing/2018/hyperlinkcolor" xmlns:p15="http://schemas.microsoft.com/office/powerpoint/2012/main" xmlns:com="http://schemas.openxmlformats.org/drawingml/2006/compatibility" xmlns:pvml="urn:schemas-microsoft-com:office:powerpoint" xmlns:v="urn:schemas-microsoft-com:vml" xmlns:o="urn:schemas-microsoft-com:office:office" xmlns:dgm="http://schemas.openxmlformats.org/drawingml/2006/diagram" xmlns:c="http://schemas.openxmlformats.org/drawingml/2006/chart" xmlns:mv="urn:schemas-microsoft-com:mac:vml" xmlns="">
+    <mc:Fallback xmlns="" xmlns:mv="urn:schemas-microsoft-com:mac:vml" xmlns:c="http://schemas.openxmlformats.org/drawingml/2006/chart" xmlns:dgm="http://schemas.openxmlformats.org/drawingml/2006/diagram" xmlns:o="urn:schemas-microsoft-com:office:office" xmlns:v="urn:schemas-microsoft-com:vml" xmlns:pvml="urn:schemas-microsoft-com:office:powerpoint" xmlns:com="http://schemas.openxmlformats.org/drawingml/2006/compatibility" xmlns:p15="http://schemas.microsoft.com/office/powerpoint/2012/main" xmlns:ahyp="http://schemas.microsoft.com/office/drawing/2018/hyperlinkcolor">
       <p:transition spd="slow">
         <p:fade/>
       </p:transition>
@@ -20914,7 +20318,7 @@
 </p:sld>
 </file>
 
-<file path=ppt/slides/slide14.xml><?xml version="1.0" encoding="utf-8"?>
+<file path=ppt/slides/slide13.xml><?xml version="1.0" encoding="utf-8"?>
 <p:sld xmlns:a="http://schemas.openxmlformats.org/drawingml/2006/main" xmlns:r="http://schemas.openxmlformats.org/officeDocument/2006/relationships" xmlns:p="http://schemas.openxmlformats.org/presentationml/2006/main">
   <p:cSld>
     <p:spTree>
@@ -21282,7 +20686,7 @@
         <p:push/>
       </p:transition>
     </mc:Choice>
-    <mc:Fallback xmlns:ahyp="http://schemas.microsoft.com/office/drawing/2018/hyperlinkcolor" xmlns:p15="http://schemas.microsoft.com/office/powerpoint/2012/main" xmlns:com="http://schemas.openxmlformats.org/drawingml/2006/compatibility" xmlns:pvml="urn:schemas-microsoft-com:office:powerpoint" xmlns:v="urn:schemas-microsoft-com:vml" xmlns:o="urn:schemas-microsoft-com:office:office" xmlns:dgm="http://schemas.openxmlformats.org/drawingml/2006/diagram" xmlns:c="http://schemas.openxmlformats.org/drawingml/2006/chart" xmlns:mv="urn:schemas-microsoft-com:mac:vml" xmlns="">
+    <mc:Fallback xmlns="" xmlns:mv="urn:schemas-microsoft-com:mac:vml" xmlns:c="http://schemas.openxmlformats.org/drawingml/2006/chart" xmlns:dgm="http://schemas.openxmlformats.org/drawingml/2006/diagram" xmlns:o="urn:schemas-microsoft-com:office:office" xmlns:v="urn:schemas-microsoft-com:vml" xmlns:pvml="urn:schemas-microsoft-com:office:powerpoint" xmlns:com="http://schemas.openxmlformats.org/drawingml/2006/compatibility" xmlns:p15="http://schemas.microsoft.com/office/powerpoint/2012/main" xmlns:ahyp="http://schemas.microsoft.com/office/drawing/2018/hyperlinkcolor">
       <p:transition spd="slow">
         <p:fade/>
       </p:transition>
@@ -21374,7 +20778,7 @@
 </p:sld>
 </file>
 
-<file path=ppt/slides/slide15.xml><?xml version="1.0" encoding="utf-8"?>
+<file path=ppt/slides/slide14.xml><?xml version="1.0" encoding="utf-8"?>
 <p:sld xmlns:a="http://schemas.openxmlformats.org/drawingml/2006/main" xmlns:r="http://schemas.openxmlformats.org/officeDocument/2006/relationships" xmlns:p="http://schemas.openxmlformats.org/presentationml/2006/main">
   <p:cSld>
     <p:bg>
@@ -21585,7 +20989,7 @@
         <p:push/>
       </p:transition>
     </mc:Choice>
-    <mc:Fallback xmlns:ahyp="http://schemas.microsoft.com/office/drawing/2018/hyperlinkcolor" xmlns:p15="http://schemas.microsoft.com/office/powerpoint/2012/main" xmlns:com="http://schemas.openxmlformats.org/drawingml/2006/compatibility" xmlns:pvml="urn:schemas-microsoft-com:office:powerpoint" xmlns:v="urn:schemas-microsoft-com:vml" xmlns:o="urn:schemas-microsoft-com:office:office" xmlns:dgm="http://schemas.openxmlformats.org/drawingml/2006/diagram" xmlns:c="http://schemas.openxmlformats.org/drawingml/2006/chart" xmlns:mv="urn:schemas-microsoft-com:mac:vml" xmlns="">
+    <mc:Fallback xmlns="" xmlns:mv="urn:schemas-microsoft-com:mac:vml" xmlns:c="http://schemas.openxmlformats.org/drawingml/2006/chart" xmlns:dgm="http://schemas.openxmlformats.org/drawingml/2006/diagram" xmlns:o="urn:schemas-microsoft-com:office:office" xmlns:v="urn:schemas-microsoft-com:vml" xmlns:pvml="urn:schemas-microsoft-com:office:powerpoint" xmlns:com="http://schemas.openxmlformats.org/drawingml/2006/compatibility" xmlns:p15="http://schemas.microsoft.com/office/powerpoint/2012/main" xmlns:ahyp="http://schemas.microsoft.com/office/drawing/2018/hyperlinkcolor">
       <p:transition spd="slow">
         <p:fade/>
       </p:transition>
@@ -21712,7 +21116,7 @@
 </p:sld>
 </file>
 
-<file path=ppt/slides/slide16.xml><?xml version="1.0" encoding="utf-8"?>
+<file path=ppt/slides/slide15.xml><?xml version="1.0" encoding="utf-8"?>
 <p:sld xmlns:a="http://schemas.openxmlformats.org/drawingml/2006/main" xmlns:r="http://schemas.openxmlformats.org/officeDocument/2006/relationships" xmlns:p="http://schemas.openxmlformats.org/presentationml/2006/main">
   <p:cSld>
     <p:spTree>
@@ -22021,7 +21425,7 @@
 </p:sld>
 </file>
 
-<file path=ppt/slides/slide17.xml><?xml version="1.0" encoding="utf-8"?>
+<file path=ppt/slides/slide16.xml><?xml version="1.0" encoding="utf-8"?>
 <p:sld xmlns:a="http://schemas.openxmlformats.org/drawingml/2006/main" xmlns:r="http://schemas.openxmlformats.org/officeDocument/2006/relationships" xmlns:p="http://schemas.openxmlformats.org/presentationml/2006/main">
   <p:cSld>
     <p:spTree>
@@ -22298,7 +21702,7 @@
         <p:push/>
       </p:transition>
     </mc:Choice>
-    <mc:Fallback xmlns:ahyp="http://schemas.microsoft.com/office/drawing/2018/hyperlinkcolor" xmlns:p15="http://schemas.microsoft.com/office/powerpoint/2012/main" xmlns:com="http://schemas.openxmlformats.org/drawingml/2006/compatibility" xmlns:pvml="urn:schemas-microsoft-com:office:powerpoint" xmlns:v="urn:schemas-microsoft-com:vml" xmlns:o="urn:schemas-microsoft-com:office:office" xmlns:dgm="http://schemas.openxmlformats.org/drawingml/2006/diagram" xmlns:c="http://schemas.openxmlformats.org/drawingml/2006/chart" xmlns:mv="urn:schemas-microsoft-com:mac:vml" xmlns="">
+    <mc:Fallback xmlns="" xmlns:mv="urn:schemas-microsoft-com:mac:vml" xmlns:c="http://schemas.openxmlformats.org/drawingml/2006/chart" xmlns:dgm="http://schemas.openxmlformats.org/drawingml/2006/diagram" xmlns:o="urn:schemas-microsoft-com:office:office" xmlns:v="urn:schemas-microsoft-com:vml" xmlns:pvml="urn:schemas-microsoft-com:office:powerpoint" xmlns:com="http://schemas.openxmlformats.org/drawingml/2006/compatibility" xmlns:p15="http://schemas.microsoft.com/office/powerpoint/2012/main" xmlns:ahyp="http://schemas.microsoft.com/office/drawing/2018/hyperlinkcolor">
       <p:transition spd="slow">
         <p:fade/>
       </p:transition>
@@ -22307,7 +21711,7 @@
 </p:sld>
 </file>
 
-<file path=ppt/slides/slide18.xml><?xml version="1.0" encoding="utf-8"?>
+<file path=ppt/slides/slide17.xml><?xml version="1.0" encoding="utf-8"?>
 <p:sld xmlns:a="http://schemas.openxmlformats.org/drawingml/2006/main" xmlns:r="http://schemas.openxmlformats.org/officeDocument/2006/relationships" xmlns:p="http://schemas.openxmlformats.org/presentationml/2006/main">
   <p:cSld>
     <p:spTree>
@@ -22487,7 +21891,7 @@
         <p:push/>
       </p:transition>
     </mc:Choice>
-    <mc:Fallback xmlns:ahyp="http://schemas.microsoft.com/office/drawing/2018/hyperlinkcolor" xmlns:p15="http://schemas.microsoft.com/office/powerpoint/2012/main" xmlns:com="http://schemas.openxmlformats.org/drawingml/2006/compatibility" xmlns:pvml="urn:schemas-microsoft-com:office:powerpoint" xmlns:v="urn:schemas-microsoft-com:vml" xmlns:o="urn:schemas-microsoft-com:office:office" xmlns:dgm="http://schemas.openxmlformats.org/drawingml/2006/diagram" xmlns:c="http://schemas.openxmlformats.org/drawingml/2006/chart" xmlns:mv="urn:schemas-microsoft-com:mac:vml" xmlns="">
+    <mc:Fallback xmlns="" xmlns:mv="urn:schemas-microsoft-com:mac:vml" xmlns:c="http://schemas.openxmlformats.org/drawingml/2006/chart" xmlns:dgm="http://schemas.openxmlformats.org/drawingml/2006/diagram" xmlns:o="urn:schemas-microsoft-com:office:office" xmlns:v="urn:schemas-microsoft-com:vml" xmlns:pvml="urn:schemas-microsoft-com:office:powerpoint" xmlns:com="http://schemas.openxmlformats.org/drawingml/2006/compatibility" xmlns:p15="http://schemas.microsoft.com/office/powerpoint/2012/main" xmlns:ahyp="http://schemas.microsoft.com/office/drawing/2018/hyperlinkcolor">
       <p:transition spd="slow">
         <p:fade/>
       </p:transition>
@@ -22582,7 +21986,7 @@
 </p:sld>
 </file>
 
-<file path=ppt/slides/slide19.xml><?xml version="1.0" encoding="utf-8"?>
+<file path=ppt/slides/slide18.xml><?xml version="1.0" encoding="utf-8"?>
 <p:sld xmlns:a="http://schemas.openxmlformats.org/drawingml/2006/main" xmlns:r="http://schemas.openxmlformats.org/officeDocument/2006/relationships" xmlns:p="http://schemas.openxmlformats.org/presentationml/2006/main">
   <p:cSld>
     <p:spTree>
@@ -22845,7 +22249,7 @@
         <p:push/>
       </p:transition>
     </mc:Choice>
-    <mc:Fallback xmlns:ahyp="http://schemas.microsoft.com/office/drawing/2018/hyperlinkcolor" xmlns:p15="http://schemas.microsoft.com/office/powerpoint/2012/main" xmlns:com="http://schemas.openxmlformats.org/drawingml/2006/compatibility" xmlns:pvml="urn:schemas-microsoft-com:office:powerpoint" xmlns:v="urn:schemas-microsoft-com:vml" xmlns:o="urn:schemas-microsoft-com:office:office" xmlns:dgm="http://schemas.openxmlformats.org/drawingml/2006/diagram" xmlns:c="http://schemas.openxmlformats.org/drawingml/2006/chart" xmlns:mv="urn:schemas-microsoft-com:mac:vml" xmlns="">
+    <mc:Fallback xmlns="" xmlns:mv="urn:schemas-microsoft-com:mac:vml" xmlns:c="http://schemas.openxmlformats.org/drawingml/2006/chart" xmlns:dgm="http://schemas.openxmlformats.org/drawingml/2006/diagram" xmlns:o="urn:schemas-microsoft-com:office:office" xmlns:v="urn:schemas-microsoft-com:vml" xmlns:pvml="urn:schemas-microsoft-com:office:powerpoint" xmlns:com="http://schemas.openxmlformats.org/drawingml/2006/compatibility" xmlns:p15="http://schemas.microsoft.com/office/powerpoint/2012/main" xmlns:ahyp="http://schemas.microsoft.com/office/drawing/2018/hyperlinkcolor">
       <p:transition spd="slow">
         <p:fade/>
       </p:transition>
@@ -22854,466 +22258,7 @@
 </p:sld>
 </file>
 
-<file path=ppt/slides/slide2.xml><?xml version="1.0" encoding="utf-8"?>
-<p:sld xmlns:a="http://schemas.openxmlformats.org/drawingml/2006/main" xmlns:r="http://schemas.openxmlformats.org/officeDocument/2006/relationships" xmlns:p="http://schemas.openxmlformats.org/presentationml/2006/main">
-  <p:cSld>
-    <p:bg>
-      <p:bgPr>
-        <a:blipFill>
-          <a:blip r:embed="rId3">
-            <a:alphaModFix/>
-          </a:blip>
-          <a:stretch>
-            <a:fillRect/>
-          </a:stretch>
-        </a:blipFill>
-        <a:effectLst/>
-      </p:bgPr>
-    </p:bg>
-    <p:spTree>
-      <p:nvGrpSpPr>
-        <p:cNvPr id="1" name="Shape 426"/>
-        <p:cNvGrpSpPr/>
-        <p:nvPr/>
-      </p:nvGrpSpPr>
-      <p:grpSpPr>
-        <a:xfrm>
-          <a:off x="0" y="0"/>
-          <a:ext cx="0" cy="0"/>
-          <a:chOff x="0" y="0"/>
-          <a:chExt cx="0" cy="0"/>
-        </a:xfrm>
-      </p:grpSpPr>
-      <p:sp>
-        <p:nvSpPr>
-          <p:cNvPr id="427" name="Google Shape;427;p58"/>
-          <p:cNvSpPr txBox="1">
-            <a:spLocks noGrp="1"/>
-          </p:cNvSpPr>
-          <p:nvPr>
-            <p:ph type="title"/>
-          </p:nvPr>
-        </p:nvSpPr>
-        <p:spPr>
-          <a:xfrm>
-            <a:off x="837566" y="1270710"/>
-            <a:ext cx="4430400" cy="572700"/>
-          </a:xfrm>
-          <a:prstGeom prst="rect">
-            <a:avLst/>
-          </a:prstGeom>
-        </p:spPr>
-        <p:txBody>
-          <a:bodyPr spcFirstLastPara="1" wrap="square" lIns="91425" tIns="91425" rIns="91425" bIns="91425" anchor="t" anchorCtr="0">
-            <a:noAutofit/>
-          </a:bodyPr>
-          <a:lstStyle/>
-          <a:p>
-            <a:pPr marL="0" lvl="0" indent="0" algn="ctr" rtl="0">
-              <a:spcBef>
-                <a:spcPts val="0"/>
-              </a:spcBef>
-              <a:spcAft>
-                <a:spcPts val="0"/>
-              </a:spcAft>
-              <a:buNone/>
-            </a:pPr>
-            <a:r>
-              <a:rPr lang="en" sz="4400" b="1" dirty="0"/>
-              <a:t>TEMA</a:t>
-            </a:r>
-            <a:endParaRPr sz="4400" b="1" dirty="0"/>
-          </a:p>
-        </p:txBody>
-      </p:sp>
-      <p:sp>
-        <p:nvSpPr>
-          <p:cNvPr id="365" name="Google Shape;365;p53"/>
-          <p:cNvSpPr txBox="1">
-            <a:spLocks/>
-          </p:cNvSpPr>
-          <p:nvPr/>
-        </p:nvSpPr>
-        <p:spPr>
-          <a:xfrm>
-            <a:off x="597311" y="2181498"/>
-            <a:ext cx="5620607" cy="1815892"/>
-          </a:xfrm>
-          <a:prstGeom prst="rect">
-            <a:avLst/>
-          </a:prstGeom>
-          <a:noFill/>
-          <a:ln>
-            <a:noFill/>
-          </a:ln>
-        </p:spPr>
-        <p:txBody>
-          <a:bodyPr spcFirstLastPara="1" wrap="square" lIns="91425" tIns="91425" rIns="91425" bIns="91425" anchor="t" anchorCtr="0">
-            <a:noAutofit/>
-          </a:bodyPr>
-          <a:lstStyle>
-            <a:defPPr marR="0" lvl="0" algn="l" rtl="0">
-              <a:lnSpc>
-                <a:spcPct val="100000"/>
-              </a:lnSpc>
-              <a:spcBef>
-                <a:spcPts val="0"/>
-              </a:spcBef>
-              <a:spcAft>
-                <a:spcPts val="0"/>
-              </a:spcAft>
-            </a:defPPr>
-            <a:lvl1pPr marL="457200" marR="0" lvl="0" indent="-342900" algn="ctr" rtl="0">
-              <a:lnSpc>
-                <a:spcPct val="100000"/>
-              </a:lnSpc>
-              <a:spcBef>
-                <a:spcPts val="0"/>
-              </a:spcBef>
-              <a:spcAft>
-                <a:spcPts val="0"/>
-              </a:spcAft>
-              <a:buClr>
-                <a:schemeClr val="dk2"/>
-              </a:buClr>
-              <a:buSzPts val="1800"/>
-              <a:buFont typeface="Montserrat Medium"/>
-              <a:buNone/>
-              <a:defRPr sz="1500" b="0" i="0" u="none" strike="noStrike" cap="none">
-                <a:solidFill>
-                  <a:schemeClr val="dk2"/>
-                </a:solidFill>
-                <a:latin typeface="Montserrat Medium"/>
-                <a:ea typeface="Montserrat Medium"/>
-                <a:cs typeface="Montserrat Medium"/>
-                <a:sym typeface="Montserrat Medium"/>
-              </a:defRPr>
-            </a:lvl1pPr>
-            <a:lvl2pPr marL="914400" marR="0" lvl="1" indent="-317500" algn="ctr" rtl="0">
-              <a:lnSpc>
-                <a:spcPct val="100000"/>
-              </a:lnSpc>
-              <a:spcBef>
-                <a:spcPts val="0"/>
-              </a:spcBef>
-              <a:spcAft>
-                <a:spcPts val="0"/>
-              </a:spcAft>
-              <a:buClr>
-                <a:schemeClr val="dk2"/>
-              </a:buClr>
-              <a:buSzPts val="1400"/>
-              <a:buFont typeface="Montserrat Medium"/>
-              <a:buNone/>
-              <a:defRPr sz="1400" b="0" i="0" u="none" strike="noStrike" cap="none">
-                <a:solidFill>
-                  <a:schemeClr val="dk2"/>
-                </a:solidFill>
-                <a:latin typeface="Montserrat Medium"/>
-                <a:ea typeface="Montserrat Medium"/>
-                <a:cs typeface="Montserrat Medium"/>
-                <a:sym typeface="Montserrat Medium"/>
-              </a:defRPr>
-            </a:lvl2pPr>
-            <a:lvl3pPr marL="1371600" marR="0" lvl="2" indent="-317500" algn="ctr" rtl="0">
-              <a:lnSpc>
-                <a:spcPct val="100000"/>
-              </a:lnSpc>
-              <a:spcBef>
-                <a:spcPts val="0"/>
-              </a:spcBef>
-              <a:spcAft>
-                <a:spcPts val="0"/>
-              </a:spcAft>
-              <a:buClr>
-                <a:schemeClr val="dk2"/>
-              </a:buClr>
-              <a:buSzPts val="1400"/>
-              <a:buFont typeface="Montserrat Medium"/>
-              <a:buNone/>
-              <a:defRPr sz="1400" b="0" i="0" u="none" strike="noStrike" cap="none">
-                <a:solidFill>
-                  <a:schemeClr val="dk2"/>
-                </a:solidFill>
-                <a:latin typeface="Montserrat Medium"/>
-                <a:ea typeface="Montserrat Medium"/>
-                <a:cs typeface="Montserrat Medium"/>
-                <a:sym typeface="Montserrat Medium"/>
-              </a:defRPr>
-            </a:lvl3pPr>
-            <a:lvl4pPr marL="1828800" marR="0" lvl="3" indent="-317500" algn="ctr" rtl="0">
-              <a:lnSpc>
-                <a:spcPct val="100000"/>
-              </a:lnSpc>
-              <a:spcBef>
-                <a:spcPts val="0"/>
-              </a:spcBef>
-              <a:spcAft>
-                <a:spcPts val="0"/>
-              </a:spcAft>
-              <a:buClr>
-                <a:schemeClr val="dk2"/>
-              </a:buClr>
-              <a:buSzPts val="1400"/>
-              <a:buFont typeface="Montserrat Medium"/>
-              <a:buNone/>
-              <a:defRPr sz="1400" b="0" i="0" u="none" strike="noStrike" cap="none">
-                <a:solidFill>
-                  <a:schemeClr val="dk2"/>
-                </a:solidFill>
-                <a:latin typeface="Montserrat Medium"/>
-                <a:ea typeface="Montserrat Medium"/>
-                <a:cs typeface="Montserrat Medium"/>
-                <a:sym typeface="Montserrat Medium"/>
-              </a:defRPr>
-            </a:lvl4pPr>
-            <a:lvl5pPr marL="2286000" marR="0" lvl="4" indent="-317500" algn="ctr" rtl="0">
-              <a:lnSpc>
-                <a:spcPct val="100000"/>
-              </a:lnSpc>
-              <a:spcBef>
-                <a:spcPts val="0"/>
-              </a:spcBef>
-              <a:spcAft>
-                <a:spcPts val="0"/>
-              </a:spcAft>
-              <a:buClr>
-                <a:schemeClr val="dk2"/>
-              </a:buClr>
-              <a:buSzPts val="1400"/>
-              <a:buFont typeface="Montserrat Medium"/>
-              <a:buNone/>
-              <a:defRPr sz="1400" b="0" i="0" u="none" strike="noStrike" cap="none">
-                <a:solidFill>
-                  <a:schemeClr val="dk2"/>
-                </a:solidFill>
-                <a:latin typeface="Montserrat Medium"/>
-                <a:ea typeface="Montserrat Medium"/>
-                <a:cs typeface="Montserrat Medium"/>
-                <a:sym typeface="Montserrat Medium"/>
-              </a:defRPr>
-            </a:lvl5pPr>
-            <a:lvl6pPr marL="2743200" marR="0" lvl="5" indent="-317500" algn="ctr" rtl="0">
-              <a:lnSpc>
-                <a:spcPct val="100000"/>
-              </a:lnSpc>
-              <a:spcBef>
-                <a:spcPts val="0"/>
-              </a:spcBef>
-              <a:spcAft>
-                <a:spcPts val="0"/>
-              </a:spcAft>
-              <a:buClr>
-                <a:schemeClr val="dk2"/>
-              </a:buClr>
-              <a:buSzPts val="1400"/>
-              <a:buFont typeface="Montserrat Medium"/>
-              <a:buNone/>
-              <a:defRPr sz="1400" b="0" i="0" u="none" strike="noStrike" cap="none">
-                <a:solidFill>
-                  <a:schemeClr val="dk2"/>
-                </a:solidFill>
-                <a:latin typeface="Montserrat Medium"/>
-                <a:ea typeface="Montserrat Medium"/>
-                <a:cs typeface="Montserrat Medium"/>
-                <a:sym typeface="Montserrat Medium"/>
-              </a:defRPr>
-            </a:lvl6pPr>
-            <a:lvl7pPr marL="3200400" marR="0" lvl="6" indent="-317500" algn="ctr" rtl="0">
-              <a:lnSpc>
-                <a:spcPct val="100000"/>
-              </a:lnSpc>
-              <a:spcBef>
-                <a:spcPts val="0"/>
-              </a:spcBef>
-              <a:spcAft>
-                <a:spcPts val="0"/>
-              </a:spcAft>
-              <a:buClr>
-                <a:schemeClr val="dk2"/>
-              </a:buClr>
-              <a:buSzPts val="1400"/>
-              <a:buFont typeface="Montserrat Medium"/>
-              <a:buNone/>
-              <a:defRPr sz="1400" b="0" i="0" u="none" strike="noStrike" cap="none">
-                <a:solidFill>
-                  <a:schemeClr val="dk2"/>
-                </a:solidFill>
-                <a:latin typeface="Montserrat Medium"/>
-                <a:ea typeface="Montserrat Medium"/>
-                <a:cs typeface="Montserrat Medium"/>
-                <a:sym typeface="Montserrat Medium"/>
-              </a:defRPr>
-            </a:lvl7pPr>
-            <a:lvl8pPr marL="3657600" marR="0" lvl="7" indent="-317500" algn="ctr" rtl="0">
-              <a:lnSpc>
-                <a:spcPct val="100000"/>
-              </a:lnSpc>
-              <a:spcBef>
-                <a:spcPts val="0"/>
-              </a:spcBef>
-              <a:spcAft>
-                <a:spcPts val="0"/>
-              </a:spcAft>
-              <a:buClr>
-                <a:schemeClr val="dk2"/>
-              </a:buClr>
-              <a:buSzPts val="1400"/>
-              <a:buFont typeface="Montserrat Medium"/>
-              <a:buNone/>
-              <a:defRPr sz="1400" b="0" i="0" u="none" strike="noStrike" cap="none">
-                <a:solidFill>
-                  <a:schemeClr val="dk2"/>
-                </a:solidFill>
-                <a:latin typeface="Montserrat Medium"/>
-                <a:ea typeface="Montserrat Medium"/>
-                <a:cs typeface="Montserrat Medium"/>
-                <a:sym typeface="Montserrat Medium"/>
-              </a:defRPr>
-            </a:lvl8pPr>
-            <a:lvl9pPr marL="4114800" marR="0" lvl="8" indent="-317500" algn="ctr" rtl="0">
-              <a:lnSpc>
-                <a:spcPct val="100000"/>
-              </a:lnSpc>
-              <a:spcBef>
-                <a:spcPts val="0"/>
-              </a:spcBef>
-              <a:spcAft>
-                <a:spcPts val="0"/>
-              </a:spcAft>
-              <a:buClr>
-                <a:schemeClr val="dk2"/>
-              </a:buClr>
-              <a:buSzPts val="1400"/>
-              <a:buFont typeface="Montserrat Medium"/>
-              <a:buNone/>
-              <a:defRPr sz="1400" b="0" i="0" u="none" strike="noStrike" cap="none">
-                <a:solidFill>
-                  <a:schemeClr val="dk2"/>
-                </a:solidFill>
-                <a:latin typeface="Montserrat Medium"/>
-                <a:ea typeface="Montserrat Medium"/>
-                <a:cs typeface="Montserrat Medium"/>
-                <a:sym typeface="Montserrat Medium"/>
-              </a:defRPr>
-            </a:lvl9pPr>
-          </a:lstStyle>
-          <a:p>
-            <a:pPr marL="0" indent="0"/>
-            <a:r>
-              <a:rPr lang="es-ES" sz="1800" dirty="0"/>
-              <a:t>Diseño e instalación de una plataforma web de gestión documental basado en Python con API-REST, que contribuya a la búsqueda de información y registro de documentos escaneados para el bufete de abogados Cartagena</a:t>
-            </a:r>
-          </a:p>
-        </p:txBody>
-      </p:sp>
-    </p:spTree>
-  </p:cSld>
-  <p:clrMapOvr>
-    <a:masterClrMapping/>
-  </p:clrMapOvr>
-  <mc:AlternateContent xmlns:mc="http://schemas.openxmlformats.org/markup-compatibility/2006" xmlns:p14="http://schemas.microsoft.com/office/powerpoint/2010/main">
-    <mc:Choice Requires="p14">
-      <p:transition spd="slow">
-        <p:push/>
-      </p:transition>
-    </mc:Choice>
-    <mc:Fallback xmlns:ahyp="http://schemas.microsoft.com/office/drawing/2018/hyperlinkcolor" xmlns:p15="http://schemas.microsoft.com/office/powerpoint/2012/main" xmlns:com="http://schemas.openxmlformats.org/drawingml/2006/compatibility" xmlns:pvml="urn:schemas-microsoft-com:office:powerpoint" xmlns:v="urn:schemas-microsoft-com:vml" xmlns:o="urn:schemas-microsoft-com:office:office" xmlns:dgm="http://schemas.openxmlformats.org/drawingml/2006/diagram" xmlns:c="http://schemas.openxmlformats.org/drawingml/2006/chart" xmlns:mv="urn:schemas-microsoft-com:mac:vml" xmlns="">
-      <p:transition spd="slow">
-        <p:fade/>
-      </p:transition>
-    </mc:Fallback>
-  </mc:AlternateContent>
-  <p:timing>
-    <p:tnLst>
-      <p:par>
-        <p:cTn id="1" dur="indefinite" restart="never" nodeType="tmRoot">
-          <p:childTnLst>
-            <p:seq concurrent="1" nextAc="seek">
-              <p:cTn id="2" dur="indefinite" nodeType="mainSeq">
-                <p:childTnLst>
-                  <p:par>
-                    <p:cTn id="3" fill="hold">
-                      <p:stCondLst>
-                        <p:cond delay="indefinite"/>
-                        <p:cond evt="onBegin" delay="0">
-                          <p:tn val="2"/>
-                        </p:cond>
-                      </p:stCondLst>
-                      <p:childTnLst>
-                        <p:par>
-                          <p:cTn id="4" fill="hold">
-                            <p:stCondLst>
-                              <p:cond delay="0"/>
-                            </p:stCondLst>
-                            <p:childTnLst>
-                              <p:par>
-                                <p:cTn id="5" presetID="10" presetClass="entr" presetSubtype="0" fill="hold" nodeType="withEffect">
-                                  <p:stCondLst>
-                                    <p:cond delay="0"/>
-                                  </p:stCondLst>
-                                  <p:childTnLst>
-                                    <p:set>
-                                      <p:cBhvr>
-                                        <p:cTn id="6" dur="1" fill="hold">
-                                          <p:stCondLst>
-                                            <p:cond delay="0"/>
-                                          </p:stCondLst>
-                                        </p:cTn>
-                                        <p:tgtEl>
-                                          <p:spTgt spid="365"/>
-                                        </p:tgtEl>
-                                        <p:attrNameLst>
-                                          <p:attrName>style.visibility</p:attrName>
-                                        </p:attrNameLst>
-                                      </p:cBhvr>
-                                      <p:to>
-                                        <p:strVal val="visible"/>
-                                      </p:to>
-                                    </p:set>
-                                    <p:animEffect transition="in" filter="fade">
-                                      <p:cBhvr>
-                                        <p:cTn id="7" dur="1000"/>
-                                        <p:tgtEl>
-                                          <p:spTgt spid="365"/>
-                                        </p:tgtEl>
-                                      </p:cBhvr>
-                                    </p:animEffect>
-                                  </p:childTnLst>
-                                </p:cTn>
-                              </p:par>
-                            </p:childTnLst>
-                          </p:cTn>
-                        </p:par>
-                      </p:childTnLst>
-                    </p:cTn>
-                  </p:par>
-                </p:childTnLst>
-              </p:cTn>
-              <p:prevCondLst>
-                <p:cond evt="onPrev" delay="0">
-                  <p:tgtEl>
-                    <p:sldTgt/>
-                  </p:tgtEl>
-                </p:cond>
-              </p:prevCondLst>
-              <p:nextCondLst>
-                <p:cond evt="onNext" delay="0">
-                  <p:tgtEl>
-                    <p:sldTgt/>
-                  </p:tgtEl>
-                </p:cond>
-              </p:nextCondLst>
-            </p:seq>
-          </p:childTnLst>
-        </p:cTn>
-      </p:par>
-    </p:tnLst>
-  </p:timing>
-</p:sld>
-</file>
-
-<file path=ppt/slides/slide20.xml><?xml version="1.0" encoding="utf-8"?>
+<file path=ppt/slides/slide19.xml><?xml version="1.0" encoding="utf-8"?>
 <p:sld xmlns:a="http://schemas.openxmlformats.org/drawingml/2006/main" xmlns:r="http://schemas.openxmlformats.org/officeDocument/2006/relationships" xmlns:p="http://schemas.openxmlformats.org/presentationml/2006/main">
   <p:cSld>
     <p:spTree>
@@ -23607,7 +22552,7 @@
         <p:push/>
       </p:transition>
     </mc:Choice>
-    <mc:Fallback xmlns:ahyp="http://schemas.microsoft.com/office/drawing/2018/hyperlinkcolor" xmlns:p15="http://schemas.microsoft.com/office/powerpoint/2012/main" xmlns:com="http://schemas.openxmlformats.org/drawingml/2006/compatibility" xmlns:pvml="urn:schemas-microsoft-com:office:powerpoint" xmlns:v="urn:schemas-microsoft-com:vml" xmlns:o="urn:schemas-microsoft-com:office:office" xmlns:dgm="http://schemas.openxmlformats.org/drawingml/2006/diagram" xmlns:c="http://schemas.openxmlformats.org/drawingml/2006/chart" xmlns:mv="urn:schemas-microsoft-com:mac:vml" xmlns="">
+    <mc:Fallback xmlns="" xmlns:mv="urn:schemas-microsoft-com:mac:vml" xmlns:c="http://schemas.openxmlformats.org/drawingml/2006/chart" xmlns:dgm="http://schemas.openxmlformats.org/drawingml/2006/diagram" xmlns:o="urn:schemas-microsoft-com:office:office" xmlns:v="urn:schemas-microsoft-com:vml" xmlns:pvml="urn:schemas-microsoft-com:office:powerpoint" xmlns:com="http://schemas.openxmlformats.org/drawingml/2006/compatibility" xmlns:p15="http://schemas.microsoft.com/office/powerpoint/2012/main" xmlns:ahyp="http://schemas.microsoft.com/office/drawing/2018/hyperlinkcolor">
       <p:transition spd="slow">
         <p:fade/>
       </p:transition>
@@ -23702,7 +22647,466 @@
 </p:sld>
 </file>
 
-<file path=ppt/slides/slide21.xml><?xml version="1.0" encoding="utf-8"?>
+<file path=ppt/slides/slide2.xml><?xml version="1.0" encoding="utf-8"?>
+<p:sld xmlns:a="http://schemas.openxmlformats.org/drawingml/2006/main" xmlns:r="http://schemas.openxmlformats.org/officeDocument/2006/relationships" xmlns:p="http://schemas.openxmlformats.org/presentationml/2006/main">
+  <p:cSld>
+    <p:bg>
+      <p:bgPr>
+        <a:blipFill>
+          <a:blip r:embed="rId3">
+            <a:alphaModFix/>
+          </a:blip>
+          <a:stretch>
+            <a:fillRect/>
+          </a:stretch>
+        </a:blipFill>
+        <a:effectLst/>
+      </p:bgPr>
+    </p:bg>
+    <p:spTree>
+      <p:nvGrpSpPr>
+        <p:cNvPr id="1" name="Shape 426"/>
+        <p:cNvGrpSpPr/>
+        <p:nvPr/>
+      </p:nvGrpSpPr>
+      <p:grpSpPr>
+        <a:xfrm>
+          <a:off x="0" y="0"/>
+          <a:ext cx="0" cy="0"/>
+          <a:chOff x="0" y="0"/>
+          <a:chExt cx="0" cy="0"/>
+        </a:xfrm>
+      </p:grpSpPr>
+      <p:sp>
+        <p:nvSpPr>
+          <p:cNvPr id="427" name="Google Shape;427;p58"/>
+          <p:cNvSpPr txBox="1">
+            <a:spLocks noGrp="1"/>
+          </p:cNvSpPr>
+          <p:nvPr>
+            <p:ph type="title"/>
+          </p:nvPr>
+        </p:nvSpPr>
+        <p:spPr>
+          <a:xfrm>
+            <a:off x="837566" y="1270710"/>
+            <a:ext cx="4430400" cy="572700"/>
+          </a:xfrm>
+          <a:prstGeom prst="rect">
+            <a:avLst/>
+          </a:prstGeom>
+        </p:spPr>
+        <p:txBody>
+          <a:bodyPr spcFirstLastPara="1" wrap="square" lIns="91425" tIns="91425" rIns="91425" bIns="91425" anchor="t" anchorCtr="0">
+            <a:noAutofit/>
+          </a:bodyPr>
+          <a:lstStyle/>
+          <a:p>
+            <a:pPr marL="0" lvl="0" indent="0" algn="ctr" rtl="0">
+              <a:spcBef>
+                <a:spcPts val="0"/>
+              </a:spcBef>
+              <a:spcAft>
+                <a:spcPts val="0"/>
+              </a:spcAft>
+              <a:buNone/>
+            </a:pPr>
+            <a:r>
+              <a:rPr lang="en" sz="4400" b="1" dirty="0"/>
+              <a:t>TEMA</a:t>
+            </a:r>
+            <a:endParaRPr sz="4400" b="1" dirty="0"/>
+          </a:p>
+        </p:txBody>
+      </p:sp>
+      <p:sp>
+        <p:nvSpPr>
+          <p:cNvPr id="365" name="Google Shape;365;p53"/>
+          <p:cNvSpPr txBox="1">
+            <a:spLocks/>
+          </p:cNvSpPr>
+          <p:nvPr/>
+        </p:nvSpPr>
+        <p:spPr>
+          <a:xfrm>
+            <a:off x="597311" y="2181498"/>
+            <a:ext cx="5620607" cy="1815892"/>
+          </a:xfrm>
+          <a:prstGeom prst="rect">
+            <a:avLst/>
+          </a:prstGeom>
+          <a:noFill/>
+          <a:ln>
+            <a:noFill/>
+          </a:ln>
+        </p:spPr>
+        <p:txBody>
+          <a:bodyPr spcFirstLastPara="1" wrap="square" lIns="91425" tIns="91425" rIns="91425" bIns="91425" anchor="t" anchorCtr="0">
+            <a:noAutofit/>
+          </a:bodyPr>
+          <a:lstStyle>
+            <a:defPPr marR="0" lvl="0" algn="l" rtl="0">
+              <a:lnSpc>
+                <a:spcPct val="100000"/>
+              </a:lnSpc>
+              <a:spcBef>
+                <a:spcPts val="0"/>
+              </a:spcBef>
+              <a:spcAft>
+                <a:spcPts val="0"/>
+              </a:spcAft>
+            </a:defPPr>
+            <a:lvl1pPr marL="457200" marR="0" lvl="0" indent="-342900" algn="ctr" rtl="0">
+              <a:lnSpc>
+                <a:spcPct val="100000"/>
+              </a:lnSpc>
+              <a:spcBef>
+                <a:spcPts val="0"/>
+              </a:spcBef>
+              <a:spcAft>
+                <a:spcPts val="0"/>
+              </a:spcAft>
+              <a:buClr>
+                <a:schemeClr val="dk2"/>
+              </a:buClr>
+              <a:buSzPts val="1800"/>
+              <a:buFont typeface="Montserrat Medium"/>
+              <a:buNone/>
+              <a:defRPr sz="1500" b="0" i="0" u="none" strike="noStrike" cap="none">
+                <a:solidFill>
+                  <a:schemeClr val="dk2"/>
+                </a:solidFill>
+                <a:latin typeface="Montserrat Medium"/>
+                <a:ea typeface="Montserrat Medium"/>
+                <a:cs typeface="Montserrat Medium"/>
+                <a:sym typeface="Montserrat Medium"/>
+              </a:defRPr>
+            </a:lvl1pPr>
+            <a:lvl2pPr marL="914400" marR="0" lvl="1" indent="-317500" algn="ctr" rtl="0">
+              <a:lnSpc>
+                <a:spcPct val="100000"/>
+              </a:lnSpc>
+              <a:spcBef>
+                <a:spcPts val="0"/>
+              </a:spcBef>
+              <a:spcAft>
+                <a:spcPts val="0"/>
+              </a:spcAft>
+              <a:buClr>
+                <a:schemeClr val="dk2"/>
+              </a:buClr>
+              <a:buSzPts val="1400"/>
+              <a:buFont typeface="Montserrat Medium"/>
+              <a:buNone/>
+              <a:defRPr sz="1400" b="0" i="0" u="none" strike="noStrike" cap="none">
+                <a:solidFill>
+                  <a:schemeClr val="dk2"/>
+                </a:solidFill>
+                <a:latin typeface="Montserrat Medium"/>
+                <a:ea typeface="Montserrat Medium"/>
+                <a:cs typeface="Montserrat Medium"/>
+                <a:sym typeface="Montserrat Medium"/>
+              </a:defRPr>
+            </a:lvl2pPr>
+            <a:lvl3pPr marL="1371600" marR="0" lvl="2" indent="-317500" algn="ctr" rtl="0">
+              <a:lnSpc>
+                <a:spcPct val="100000"/>
+              </a:lnSpc>
+              <a:spcBef>
+                <a:spcPts val="0"/>
+              </a:spcBef>
+              <a:spcAft>
+                <a:spcPts val="0"/>
+              </a:spcAft>
+              <a:buClr>
+                <a:schemeClr val="dk2"/>
+              </a:buClr>
+              <a:buSzPts val="1400"/>
+              <a:buFont typeface="Montserrat Medium"/>
+              <a:buNone/>
+              <a:defRPr sz="1400" b="0" i="0" u="none" strike="noStrike" cap="none">
+                <a:solidFill>
+                  <a:schemeClr val="dk2"/>
+                </a:solidFill>
+                <a:latin typeface="Montserrat Medium"/>
+                <a:ea typeface="Montserrat Medium"/>
+                <a:cs typeface="Montserrat Medium"/>
+                <a:sym typeface="Montserrat Medium"/>
+              </a:defRPr>
+            </a:lvl3pPr>
+            <a:lvl4pPr marL="1828800" marR="0" lvl="3" indent="-317500" algn="ctr" rtl="0">
+              <a:lnSpc>
+                <a:spcPct val="100000"/>
+              </a:lnSpc>
+              <a:spcBef>
+                <a:spcPts val="0"/>
+              </a:spcBef>
+              <a:spcAft>
+                <a:spcPts val="0"/>
+              </a:spcAft>
+              <a:buClr>
+                <a:schemeClr val="dk2"/>
+              </a:buClr>
+              <a:buSzPts val="1400"/>
+              <a:buFont typeface="Montserrat Medium"/>
+              <a:buNone/>
+              <a:defRPr sz="1400" b="0" i="0" u="none" strike="noStrike" cap="none">
+                <a:solidFill>
+                  <a:schemeClr val="dk2"/>
+                </a:solidFill>
+                <a:latin typeface="Montserrat Medium"/>
+                <a:ea typeface="Montserrat Medium"/>
+                <a:cs typeface="Montserrat Medium"/>
+                <a:sym typeface="Montserrat Medium"/>
+              </a:defRPr>
+            </a:lvl4pPr>
+            <a:lvl5pPr marL="2286000" marR="0" lvl="4" indent="-317500" algn="ctr" rtl="0">
+              <a:lnSpc>
+                <a:spcPct val="100000"/>
+              </a:lnSpc>
+              <a:spcBef>
+                <a:spcPts val="0"/>
+              </a:spcBef>
+              <a:spcAft>
+                <a:spcPts val="0"/>
+              </a:spcAft>
+              <a:buClr>
+                <a:schemeClr val="dk2"/>
+              </a:buClr>
+              <a:buSzPts val="1400"/>
+              <a:buFont typeface="Montserrat Medium"/>
+              <a:buNone/>
+              <a:defRPr sz="1400" b="0" i="0" u="none" strike="noStrike" cap="none">
+                <a:solidFill>
+                  <a:schemeClr val="dk2"/>
+                </a:solidFill>
+                <a:latin typeface="Montserrat Medium"/>
+                <a:ea typeface="Montserrat Medium"/>
+                <a:cs typeface="Montserrat Medium"/>
+                <a:sym typeface="Montserrat Medium"/>
+              </a:defRPr>
+            </a:lvl5pPr>
+            <a:lvl6pPr marL="2743200" marR="0" lvl="5" indent="-317500" algn="ctr" rtl="0">
+              <a:lnSpc>
+                <a:spcPct val="100000"/>
+              </a:lnSpc>
+              <a:spcBef>
+                <a:spcPts val="0"/>
+              </a:spcBef>
+              <a:spcAft>
+                <a:spcPts val="0"/>
+              </a:spcAft>
+              <a:buClr>
+                <a:schemeClr val="dk2"/>
+              </a:buClr>
+              <a:buSzPts val="1400"/>
+              <a:buFont typeface="Montserrat Medium"/>
+              <a:buNone/>
+              <a:defRPr sz="1400" b="0" i="0" u="none" strike="noStrike" cap="none">
+                <a:solidFill>
+                  <a:schemeClr val="dk2"/>
+                </a:solidFill>
+                <a:latin typeface="Montserrat Medium"/>
+                <a:ea typeface="Montserrat Medium"/>
+                <a:cs typeface="Montserrat Medium"/>
+                <a:sym typeface="Montserrat Medium"/>
+              </a:defRPr>
+            </a:lvl6pPr>
+            <a:lvl7pPr marL="3200400" marR="0" lvl="6" indent="-317500" algn="ctr" rtl="0">
+              <a:lnSpc>
+                <a:spcPct val="100000"/>
+              </a:lnSpc>
+              <a:spcBef>
+                <a:spcPts val="0"/>
+              </a:spcBef>
+              <a:spcAft>
+                <a:spcPts val="0"/>
+              </a:spcAft>
+              <a:buClr>
+                <a:schemeClr val="dk2"/>
+              </a:buClr>
+              <a:buSzPts val="1400"/>
+              <a:buFont typeface="Montserrat Medium"/>
+              <a:buNone/>
+              <a:defRPr sz="1400" b="0" i="0" u="none" strike="noStrike" cap="none">
+                <a:solidFill>
+                  <a:schemeClr val="dk2"/>
+                </a:solidFill>
+                <a:latin typeface="Montserrat Medium"/>
+                <a:ea typeface="Montserrat Medium"/>
+                <a:cs typeface="Montserrat Medium"/>
+                <a:sym typeface="Montserrat Medium"/>
+              </a:defRPr>
+            </a:lvl7pPr>
+            <a:lvl8pPr marL="3657600" marR="0" lvl="7" indent="-317500" algn="ctr" rtl="0">
+              <a:lnSpc>
+                <a:spcPct val="100000"/>
+              </a:lnSpc>
+              <a:spcBef>
+                <a:spcPts val="0"/>
+              </a:spcBef>
+              <a:spcAft>
+                <a:spcPts val="0"/>
+              </a:spcAft>
+              <a:buClr>
+                <a:schemeClr val="dk2"/>
+              </a:buClr>
+              <a:buSzPts val="1400"/>
+              <a:buFont typeface="Montserrat Medium"/>
+              <a:buNone/>
+              <a:defRPr sz="1400" b="0" i="0" u="none" strike="noStrike" cap="none">
+                <a:solidFill>
+                  <a:schemeClr val="dk2"/>
+                </a:solidFill>
+                <a:latin typeface="Montserrat Medium"/>
+                <a:ea typeface="Montserrat Medium"/>
+                <a:cs typeface="Montserrat Medium"/>
+                <a:sym typeface="Montserrat Medium"/>
+              </a:defRPr>
+            </a:lvl8pPr>
+            <a:lvl9pPr marL="4114800" marR="0" lvl="8" indent="-317500" algn="ctr" rtl="0">
+              <a:lnSpc>
+                <a:spcPct val="100000"/>
+              </a:lnSpc>
+              <a:spcBef>
+                <a:spcPts val="0"/>
+              </a:spcBef>
+              <a:spcAft>
+                <a:spcPts val="0"/>
+              </a:spcAft>
+              <a:buClr>
+                <a:schemeClr val="dk2"/>
+              </a:buClr>
+              <a:buSzPts val="1400"/>
+              <a:buFont typeface="Montserrat Medium"/>
+              <a:buNone/>
+              <a:defRPr sz="1400" b="0" i="0" u="none" strike="noStrike" cap="none">
+                <a:solidFill>
+                  <a:schemeClr val="dk2"/>
+                </a:solidFill>
+                <a:latin typeface="Montserrat Medium"/>
+                <a:ea typeface="Montserrat Medium"/>
+                <a:cs typeface="Montserrat Medium"/>
+                <a:sym typeface="Montserrat Medium"/>
+              </a:defRPr>
+            </a:lvl9pPr>
+          </a:lstStyle>
+          <a:p>
+            <a:pPr marL="0" indent="0"/>
+            <a:r>
+              <a:rPr lang="es-ES" sz="1800" dirty="0"/>
+              <a:t>Diseño e instalación de una plataforma web de gestión documental basado en Python con API-REST, que contribuya a la búsqueda de información y registro de documentos escaneados para el bufete de abogados Cartagena</a:t>
+            </a:r>
+          </a:p>
+        </p:txBody>
+      </p:sp>
+    </p:spTree>
+  </p:cSld>
+  <p:clrMapOvr>
+    <a:masterClrMapping/>
+  </p:clrMapOvr>
+  <mc:AlternateContent xmlns:mc="http://schemas.openxmlformats.org/markup-compatibility/2006" xmlns:p14="http://schemas.microsoft.com/office/powerpoint/2010/main">
+    <mc:Choice Requires="p14">
+      <p:transition spd="slow">
+        <p:push/>
+      </p:transition>
+    </mc:Choice>
+    <mc:Fallback xmlns="" xmlns:mv="urn:schemas-microsoft-com:mac:vml" xmlns:c="http://schemas.openxmlformats.org/drawingml/2006/chart" xmlns:dgm="http://schemas.openxmlformats.org/drawingml/2006/diagram" xmlns:o="urn:schemas-microsoft-com:office:office" xmlns:v="urn:schemas-microsoft-com:vml" xmlns:pvml="urn:schemas-microsoft-com:office:powerpoint" xmlns:com="http://schemas.openxmlformats.org/drawingml/2006/compatibility" xmlns:p15="http://schemas.microsoft.com/office/powerpoint/2012/main" xmlns:ahyp="http://schemas.microsoft.com/office/drawing/2018/hyperlinkcolor">
+      <p:transition spd="slow">
+        <p:fade/>
+      </p:transition>
+    </mc:Fallback>
+  </mc:AlternateContent>
+  <p:timing>
+    <p:tnLst>
+      <p:par>
+        <p:cTn id="1" dur="indefinite" restart="never" nodeType="tmRoot">
+          <p:childTnLst>
+            <p:seq concurrent="1" nextAc="seek">
+              <p:cTn id="2" dur="indefinite" nodeType="mainSeq">
+                <p:childTnLst>
+                  <p:par>
+                    <p:cTn id="3" fill="hold">
+                      <p:stCondLst>
+                        <p:cond delay="indefinite"/>
+                        <p:cond evt="onBegin" delay="0">
+                          <p:tn val="2"/>
+                        </p:cond>
+                      </p:stCondLst>
+                      <p:childTnLst>
+                        <p:par>
+                          <p:cTn id="4" fill="hold">
+                            <p:stCondLst>
+                              <p:cond delay="0"/>
+                            </p:stCondLst>
+                            <p:childTnLst>
+                              <p:par>
+                                <p:cTn id="5" presetID="10" presetClass="entr" presetSubtype="0" fill="hold" nodeType="withEffect">
+                                  <p:stCondLst>
+                                    <p:cond delay="0"/>
+                                  </p:stCondLst>
+                                  <p:childTnLst>
+                                    <p:set>
+                                      <p:cBhvr>
+                                        <p:cTn id="6" dur="1" fill="hold">
+                                          <p:stCondLst>
+                                            <p:cond delay="0"/>
+                                          </p:stCondLst>
+                                        </p:cTn>
+                                        <p:tgtEl>
+                                          <p:spTgt spid="365"/>
+                                        </p:tgtEl>
+                                        <p:attrNameLst>
+                                          <p:attrName>style.visibility</p:attrName>
+                                        </p:attrNameLst>
+                                      </p:cBhvr>
+                                      <p:to>
+                                        <p:strVal val="visible"/>
+                                      </p:to>
+                                    </p:set>
+                                    <p:animEffect transition="in" filter="fade">
+                                      <p:cBhvr>
+                                        <p:cTn id="7" dur="1000"/>
+                                        <p:tgtEl>
+                                          <p:spTgt spid="365"/>
+                                        </p:tgtEl>
+                                      </p:cBhvr>
+                                    </p:animEffect>
+                                  </p:childTnLst>
+                                </p:cTn>
+                              </p:par>
+                            </p:childTnLst>
+                          </p:cTn>
+                        </p:par>
+                      </p:childTnLst>
+                    </p:cTn>
+                  </p:par>
+                </p:childTnLst>
+              </p:cTn>
+              <p:prevCondLst>
+                <p:cond evt="onPrev" delay="0">
+                  <p:tgtEl>
+                    <p:sldTgt/>
+                  </p:tgtEl>
+                </p:cond>
+              </p:prevCondLst>
+              <p:nextCondLst>
+                <p:cond evt="onNext" delay="0">
+                  <p:tgtEl>
+                    <p:sldTgt/>
+                  </p:tgtEl>
+                </p:cond>
+              </p:nextCondLst>
+            </p:seq>
+          </p:childTnLst>
+        </p:cTn>
+      </p:par>
+    </p:tnLst>
+  </p:timing>
+</p:sld>
+</file>
+
+<file path=ppt/slides/slide20.xml><?xml version="1.0" encoding="utf-8"?>
 <p:sld xmlns:a="http://schemas.openxmlformats.org/drawingml/2006/main" xmlns:r="http://schemas.openxmlformats.org/officeDocument/2006/relationships" xmlns:p="http://schemas.openxmlformats.org/presentationml/2006/main">
   <p:cSld>
     <p:bg>
@@ -24788,7 +24192,7 @@
         <p:push/>
       </p:transition>
     </mc:Choice>
-    <mc:Fallback xmlns:ahyp="http://schemas.microsoft.com/office/drawing/2018/hyperlinkcolor" xmlns:p15="http://schemas.microsoft.com/office/powerpoint/2012/main" xmlns:com="http://schemas.openxmlformats.org/drawingml/2006/compatibility" xmlns:pvml="urn:schemas-microsoft-com:office:powerpoint" xmlns:v="urn:schemas-microsoft-com:vml" xmlns:o="urn:schemas-microsoft-com:office:office" xmlns:dgm="http://schemas.openxmlformats.org/drawingml/2006/diagram" xmlns:c="http://schemas.openxmlformats.org/drawingml/2006/chart" xmlns:mv="urn:schemas-microsoft-com:mac:vml" xmlns="">
+    <mc:Fallback xmlns="" xmlns:mv="urn:schemas-microsoft-com:mac:vml" xmlns:c="http://schemas.openxmlformats.org/drawingml/2006/chart" xmlns:dgm="http://schemas.openxmlformats.org/drawingml/2006/diagram" xmlns:o="urn:schemas-microsoft-com:office:office" xmlns:v="urn:schemas-microsoft-com:vml" xmlns:pvml="urn:schemas-microsoft-com:office:powerpoint" xmlns:com="http://schemas.openxmlformats.org/drawingml/2006/compatibility" xmlns:p15="http://schemas.microsoft.com/office/powerpoint/2012/main" xmlns:ahyp="http://schemas.microsoft.com/office/drawing/2018/hyperlinkcolor">
       <p:transition spd="slow">
         <p:fade/>
       </p:transition>
@@ -24797,7 +24201,7 @@
 </p:sld>
 </file>
 
-<file path=ppt/slides/slide22.xml><?xml version="1.0" encoding="utf-8"?>
+<file path=ppt/slides/slide21.xml><?xml version="1.0" encoding="utf-8"?>
 <p:sld xmlns:a="http://schemas.openxmlformats.org/drawingml/2006/main" xmlns:r="http://schemas.openxmlformats.org/officeDocument/2006/relationships" xmlns:p="http://schemas.openxmlformats.org/presentationml/2006/main">
   <p:cSld>
     <p:spTree>
@@ -24902,7 +24306,7 @@
 </p:sld>
 </file>
 
-<file path=ppt/slides/slide23.xml><?xml version="1.0" encoding="utf-8"?>
+<file path=ppt/slides/slide22.xml><?xml version="1.0" encoding="utf-8"?>
 <p:sld xmlns:a="http://schemas.openxmlformats.org/drawingml/2006/main" xmlns:r="http://schemas.openxmlformats.org/officeDocument/2006/relationships" xmlns:p="http://schemas.openxmlformats.org/presentationml/2006/main">
   <p:cSld>
     <p:spTree>
@@ -25227,7 +24631,7 @@
 </p:sld>
 </file>
 
-<file path=ppt/slides/slide24.xml><?xml version="1.0" encoding="utf-8"?>
+<file path=ppt/slides/slide23.xml><?xml version="1.0" encoding="utf-8"?>
 <p:sld xmlns:a="http://schemas.openxmlformats.org/drawingml/2006/main" xmlns:r="http://schemas.openxmlformats.org/officeDocument/2006/relationships" xmlns:p="http://schemas.openxmlformats.org/presentationml/2006/main">
   <p:cSld>
     <p:spTree>
@@ -25506,7 +24910,7 @@
 </p:sld>
 </file>
 
-<file path=ppt/slides/slide25.xml><?xml version="1.0" encoding="utf-8"?>
+<file path=ppt/slides/slide24.xml><?xml version="1.0" encoding="utf-8"?>
 <p:sld xmlns:a="http://schemas.openxmlformats.org/drawingml/2006/main" xmlns:r="http://schemas.openxmlformats.org/officeDocument/2006/relationships" xmlns:p="http://schemas.openxmlformats.org/presentationml/2006/main">
   <p:cSld>
     <p:spTree>
@@ -25743,7 +25147,7 @@
 </p:sld>
 </file>
 
-<file path=ppt/slides/slide26.xml><?xml version="1.0" encoding="utf-8"?>
+<file path=ppt/slides/slide25.xml><?xml version="1.0" encoding="utf-8"?>
 <p:sld xmlns:a="http://schemas.openxmlformats.org/drawingml/2006/main" xmlns:r="http://schemas.openxmlformats.org/officeDocument/2006/relationships" xmlns:p="http://schemas.openxmlformats.org/presentationml/2006/main">
   <p:cSld>
     <p:spTree>
@@ -25980,7 +25384,7 @@
 </p:sld>
 </file>
 
-<file path=ppt/slides/slide27.xml><?xml version="1.0" encoding="utf-8"?>
+<file path=ppt/slides/slide26.xml><?xml version="1.0" encoding="utf-8"?>
 <p:sld xmlns:a="http://schemas.openxmlformats.org/drawingml/2006/main" xmlns:r="http://schemas.openxmlformats.org/officeDocument/2006/relationships" xmlns:p="http://schemas.openxmlformats.org/presentationml/2006/main">
   <p:cSld>
     <p:spTree>
@@ -26217,7 +25621,7 @@
 </p:sld>
 </file>
 
-<file path=ppt/slides/slide28.xml><?xml version="1.0" encoding="utf-8"?>
+<file path=ppt/slides/slide27.xml><?xml version="1.0" encoding="utf-8"?>
 <p:sld xmlns:a="http://schemas.openxmlformats.org/drawingml/2006/main" xmlns:r="http://schemas.openxmlformats.org/officeDocument/2006/relationships" xmlns:p="http://schemas.openxmlformats.org/presentationml/2006/main">
   <p:cSld>
     <p:spTree>
@@ -26454,7 +25858,7 @@
 </p:sld>
 </file>
 
-<file path=ppt/slides/slide29.xml><?xml version="1.0" encoding="utf-8"?>
+<file path=ppt/slides/slide28.xml><?xml version="1.0" encoding="utf-8"?>
 <p:sld xmlns:a="http://schemas.openxmlformats.org/drawingml/2006/main" xmlns:r="http://schemas.openxmlformats.org/officeDocument/2006/relationships" xmlns:p="http://schemas.openxmlformats.org/presentationml/2006/main">
   <p:cSld>
     <p:spTree>
@@ -26718,462 +26122,7 @@
 </p:sld>
 </file>
 
-<file path=ppt/slides/slide3.xml><?xml version="1.0" encoding="utf-8"?>
-<p:sld xmlns:a="http://schemas.openxmlformats.org/drawingml/2006/main" xmlns:r="http://schemas.openxmlformats.org/officeDocument/2006/relationships" xmlns:p="http://schemas.openxmlformats.org/presentationml/2006/main">
-  <p:cSld>
-    <p:bg>
-      <p:bgPr>
-        <a:blipFill>
-          <a:blip r:embed="rId3">
-            <a:alphaModFix/>
-          </a:blip>
-          <a:stretch>
-            <a:fillRect/>
-          </a:stretch>
-        </a:blipFill>
-        <a:effectLst/>
-      </p:bgPr>
-    </p:bg>
-    <p:spTree>
-      <p:nvGrpSpPr>
-        <p:cNvPr id="1" name="Shape 426"/>
-        <p:cNvGrpSpPr/>
-        <p:nvPr/>
-      </p:nvGrpSpPr>
-      <p:grpSpPr>
-        <a:xfrm>
-          <a:off x="0" y="0"/>
-          <a:ext cx="0" cy="0"/>
-          <a:chOff x="0" y="0"/>
-          <a:chExt cx="0" cy="0"/>
-        </a:xfrm>
-      </p:grpSpPr>
-      <p:sp>
-        <p:nvSpPr>
-          <p:cNvPr id="427" name="Google Shape;427;p58"/>
-          <p:cNvSpPr txBox="1">
-            <a:spLocks noGrp="1"/>
-          </p:cNvSpPr>
-          <p:nvPr>
-            <p:ph type="title"/>
-          </p:nvPr>
-        </p:nvSpPr>
-        <p:spPr>
-          <a:xfrm>
-            <a:off x="597311" y="859760"/>
-            <a:ext cx="5106034" cy="572700"/>
-          </a:xfrm>
-          <a:prstGeom prst="rect">
-            <a:avLst/>
-          </a:prstGeom>
-        </p:spPr>
-        <p:txBody>
-          <a:bodyPr spcFirstLastPara="1" wrap="square" lIns="91425" tIns="91425" rIns="91425" bIns="91425" anchor="t" anchorCtr="0">
-            <a:noAutofit/>
-          </a:bodyPr>
-          <a:lstStyle/>
-          <a:p>
-            <a:pPr marL="0" lvl="0" indent="0" algn="ctr" rtl="0">
-              <a:spcBef>
-                <a:spcPts val="0"/>
-              </a:spcBef>
-              <a:spcAft>
-                <a:spcPts val="0"/>
-              </a:spcAft>
-              <a:buNone/>
-            </a:pPr>
-            <a:r>
-              <a:rPr lang="en" sz="4400" b="1" dirty="0"/>
-              <a:t>INTRODUCCIÓN</a:t>
-            </a:r>
-            <a:endParaRPr sz="4400" b="1" dirty="0"/>
-          </a:p>
-        </p:txBody>
-      </p:sp>
-      <p:sp>
-        <p:nvSpPr>
-          <p:cNvPr id="365" name="Google Shape;365;p53"/>
-          <p:cNvSpPr txBox="1">
-            <a:spLocks/>
-          </p:cNvSpPr>
-          <p:nvPr/>
-        </p:nvSpPr>
-        <p:spPr>
-          <a:xfrm>
-            <a:off x="597311" y="2181498"/>
-            <a:ext cx="5106034" cy="1815892"/>
-          </a:xfrm>
-          <a:prstGeom prst="rect">
-            <a:avLst/>
-          </a:prstGeom>
-          <a:noFill/>
-          <a:ln>
-            <a:noFill/>
-          </a:ln>
-        </p:spPr>
-        <p:txBody>
-          <a:bodyPr spcFirstLastPara="1" wrap="square" lIns="91425" tIns="91425" rIns="91425" bIns="91425" anchor="t" anchorCtr="0">
-            <a:noAutofit/>
-          </a:bodyPr>
-          <a:lstStyle>
-            <a:defPPr marR="0" lvl="0" algn="l" rtl="0">
-              <a:lnSpc>
-                <a:spcPct val="100000"/>
-              </a:lnSpc>
-              <a:spcBef>
-                <a:spcPts val="0"/>
-              </a:spcBef>
-              <a:spcAft>
-                <a:spcPts val="0"/>
-              </a:spcAft>
-            </a:defPPr>
-            <a:lvl1pPr marL="457200" marR="0" lvl="0" indent="-342900" algn="ctr" rtl="0">
-              <a:lnSpc>
-                <a:spcPct val="100000"/>
-              </a:lnSpc>
-              <a:spcBef>
-                <a:spcPts val="0"/>
-              </a:spcBef>
-              <a:spcAft>
-                <a:spcPts val="0"/>
-              </a:spcAft>
-              <a:buClr>
-                <a:schemeClr val="dk2"/>
-              </a:buClr>
-              <a:buSzPts val="1800"/>
-              <a:buFont typeface="Montserrat Medium"/>
-              <a:buNone/>
-              <a:defRPr sz="1500" b="0" i="0" u="none" strike="noStrike" cap="none">
-                <a:solidFill>
-                  <a:schemeClr val="dk2"/>
-                </a:solidFill>
-                <a:latin typeface="Montserrat Medium"/>
-                <a:ea typeface="Montserrat Medium"/>
-                <a:cs typeface="Montserrat Medium"/>
-                <a:sym typeface="Montserrat Medium"/>
-              </a:defRPr>
-            </a:lvl1pPr>
-            <a:lvl2pPr marL="914400" marR="0" lvl="1" indent="-317500" algn="ctr" rtl="0">
-              <a:lnSpc>
-                <a:spcPct val="100000"/>
-              </a:lnSpc>
-              <a:spcBef>
-                <a:spcPts val="0"/>
-              </a:spcBef>
-              <a:spcAft>
-                <a:spcPts val="0"/>
-              </a:spcAft>
-              <a:buClr>
-                <a:schemeClr val="dk2"/>
-              </a:buClr>
-              <a:buSzPts val="1400"/>
-              <a:buFont typeface="Montserrat Medium"/>
-              <a:buNone/>
-              <a:defRPr sz="1400" b="0" i="0" u="none" strike="noStrike" cap="none">
-                <a:solidFill>
-                  <a:schemeClr val="dk2"/>
-                </a:solidFill>
-                <a:latin typeface="Montserrat Medium"/>
-                <a:ea typeface="Montserrat Medium"/>
-                <a:cs typeface="Montserrat Medium"/>
-                <a:sym typeface="Montserrat Medium"/>
-              </a:defRPr>
-            </a:lvl2pPr>
-            <a:lvl3pPr marL="1371600" marR="0" lvl="2" indent="-317500" algn="ctr" rtl="0">
-              <a:lnSpc>
-                <a:spcPct val="100000"/>
-              </a:lnSpc>
-              <a:spcBef>
-                <a:spcPts val="0"/>
-              </a:spcBef>
-              <a:spcAft>
-                <a:spcPts val="0"/>
-              </a:spcAft>
-              <a:buClr>
-                <a:schemeClr val="dk2"/>
-              </a:buClr>
-              <a:buSzPts val="1400"/>
-              <a:buFont typeface="Montserrat Medium"/>
-              <a:buNone/>
-              <a:defRPr sz="1400" b="0" i="0" u="none" strike="noStrike" cap="none">
-                <a:solidFill>
-                  <a:schemeClr val="dk2"/>
-                </a:solidFill>
-                <a:latin typeface="Montserrat Medium"/>
-                <a:ea typeface="Montserrat Medium"/>
-                <a:cs typeface="Montserrat Medium"/>
-                <a:sym typeface="Montserrat Medium"/>
-              </a:defRPr>
-            </a:lvl3pPr>
-            <a:lvl4pPr marL="1828800" marR="0" lvl="3" indent="-317500" algn="ctr" rtl="0">
-              <a:lnSpc>
-                <a:spcPct val="100000"/>
-              </a:lnSpc>
-              <a:spcBef>
-                <a:spcPts val="0"/>
-              </a:spcBef>
-              <a:spcAft>
-                <a:spcPts val="0"/>
-              </a:spcAft>
-              <a:buClr>
-                <a:schemeClr val="dk2"/>
-              </a:buClr>
-              <a:buSzPts val="1400"/>
-              <a:buFont typeface="Montserrat Medium"/>
-              <a:buNone/>
-              <a:defRPr sz="1400" b="0" i="0" u="none" strike="noStrike" cap="none">
-                <a:solidFill>
-                  <a:schemeClr val="dk2"/>
-                </a:solidFill>
-                <a:latin typeface="Montserrat Medium"/>
-                <a:ea typeface="Montserrat Medium"/>
-                <a:cs typeface="Montserrat Medium"/>
-                <a:sym typeface="Montserrat Medium"/>
-              </a:defRPr>
-            </a:lvl4pPr>
-            <a:lvl5pPr marL="2286000" marR="0" lvl="4" indent="-317500" algn="ctr" rtl="0">
-              <a:lnSpc>
-                <a:spcPct val="100000"/>
-              </a:lnSpc>
-              <a:spcBef>
-                <a:spcPts val="0"/>
-              </a:spcBef>
-              <a:spcAft>
-                <a:spcPts val="0"/>
-              </a:spcAft>
-              <a:buClr>
-                <a:schemeClr val="dk2"/>
-              </a:buClr>
-              <a:buSzPts val="1400"/>
-              <a:buFont typeface="Montserrat Medium"/>
-              <a:buNone/>
-              <a:defRPr sz="1400" b="0" i="0" u="none" strike="noStrike" cap="none">
-                <a:solidFill>
-                  <a:schemeClr val="dk2"/>
-                </a:solidFill>
-                <a:latin typeface="Montserrat Medium"/>
-                <a:ea typeface="Montserrat Medium"/>
-                <a:cs typeface="Montserrat Medium"/>
-                <a:sym typeface="Montserrat Medium"/>
-              </a:defRPr>
-            </a:lvl5pPr>
-            <a:lvl6pPr marL="2743200" marR="0" lvl="5" indent="-317500" algn="ctr" rtl="0">
-              <a:lnSpc>
-                <a:spcPct val="100000"/>
-              </a:lnSpc>
-              <a:spcBef>
-                <a:spcPts val="0"/>
-              </a:spcBef>
-              <a:spcAft>
-                <a:spcPts val="0"/>
-              </a:spcAft>
-              <a:buClr>
-                <a:schemeClr val="dk2"/>
-              </a:buClr>
-              <a:buSzPts val="1400"/>
-              <a:buFont typeface="Montserrat Medium"/>
-              <a:buNone/>
-              <a:defRPr sz="1400" b="0" i="0" u="none" strike="noStrike" cap="none">
-                <a:solidFill>
-                  <a:schemeClr val="dk2"/>
-                </a:solidFill>
-                <a:latin typeface="Montserrat Medium"/>
-                <a:ea typeface="Montserrat Medium"/>
-                <a:cs typeface="Montserrat Medium"/>
-                <a:sym typeface="Montserrat Medium"/>
-              </a:defRPr>
-            </a:lvl6pPr>
-            <a:lvl7pPr marL="3200400" marR="0" lvl="6" indent="-317500" algn="ctr" rtl="0">
-              <a:lnSpc>
-                <a:spcPct val="100000"/>
-              </a:lnSpc>
-              <a:spcBef>
-                <a:spcPts val="0"/>
-              </a:spcBef>
-              <a:spcAft>
-                <a:spcPts val="0"/>
-              </a:spcAft>
-              <a:buClr>
-                <a:schemeClr val="dk2"/>
-              </a:buClr>
-              <a:buSzPts val="1400"/>
-              <a:buFont typeface="Montserrat Medium"/>
-              <a:buNone/>
-              <a:defRPr sz="1400" b="0" i="0" u="none" strike="noStrike" cap="none">
-                <a:solidFill>
-                  <a:schemeClr val="dk2"/>
-                </a:solidFill>
-                <a:latin typeface="Montserrat Medium"/>
-                <a:ea typeface="Montserrat Medium"/>
-                <a:cs typeface="Montserrat Medium"/>
-                <a:sym typeface="Montserrat Medium"/>
-              </a:defRPr>
-            </a:lvl7pPr>
-            <a:lvl8pPr marL="3657600" marR="0" lvl="7" indent="-317500" algn="ctr" rtl="0">
-              <a:lnSpc>
-                <a:spcPct val="100000"/>
-              </a:lnSpc>
-              <a:spcBef>
-                <a:spcPts val="0"/>
-              </a:spcBef>
-              <a:spcAft>
-                <a:spcPts val="0"/>
-              </a:spcAft>
-              <a:buClr>
-                <a:schemeClr val="dk2"/>
-              </a:buClr>
-              <a:buSzPts val="1400"/>
-              <a:buFont typeface="Montserrat Medium"/>
-              <a:buNone/>
-              <a:defRPr sz="1400" b="0" i="0" u="none" strike="noStrike" cap="none">
-                <a:solidFill>
-                  <a:schemeClr val="dk2"/>
-                </a:solidFill>
-                <a:latin typeface="Montserrat Medium"/>
-                <a:ea typeface="Montserrat Medium"/>
-                <a:cs typeface="Montserrat Medium"/>
-                <a:sym typeface="Montserrat Medium"/>
-              </a:defRPr>
-            </a:lvl8pPr>
-            <a:lvl9pPr marL="4114800" marR="0" lvl="8" indent="-317500" algn="ctr" rtl="0">
-              <a:lnSpc>
-                <a:spcPct val="100000"/>
-              </a:lnSpc>
-              <a:spcBef>
-                <a:spcPts val="0"/>
-              </a:spcBef>
-              <a:spcAft>
-                <a:spcPts val="0"/>
-              </a:spcAft>
-              <a:buClr>
-                <a:schemeClr val="dk2"/>
-              </a:buClr>
-              <a:buSzPts val="1400"/>
-              <a:buFont typeface="Montserrat Medium"/>
-              <a:buNone/>
-              <a:defRPr sz="1400" b="0" i="0" u="none" strike="noStrike" cap="none">
-                <a:solidFill>
-                  <a:schemeClr val="dk2"/>
-                </a:solidFill>
-                <a:latin typeface="Montserrat Medium"/>
-                <a:ea typeface="Montserrat Medium"/>
-                <a:cs typeface="Montserrat Medium"/>
-                <a:sym typeface="Montserrat Medium"/>
-              </a:defRPr>
-            </a:lvl9pPr>
-          </a:lstStyle>
-          <a:p>
-            <a:pPr algn="just"/>
-            <a:r>
-              <a:rPr lang="es-SV" sz="1600" dirty="0"/>
-              <a:t>En el presente trabajo se aborda la gestión, la búsqueda y los registros de documentos escaneados del bufete de abogados Cartagena, como un panorama actual de la tecnología de la información, donde la gestión eficiente de documentos se ha convertido en un tema de gran importancia.</a:t>
-            </a:r>
-          </a:p>
-        </p:txBody>
-      </p:sp>
-    </p:spTree>
-    <p:extLst>
-      <p:ext uri="{BB962C8B-B14F-4D97-AF65-F5344CB8AC3E}">
-        <p14:creationId xmlns:p14="http://schemas.microsoft.com/office/powerpoint/2010/main" val="1716865091"/>
-      </p:ext>
-    </p:extLst>
-  </p:cSld>
-  <p:clrMapOvr>
-    <a:masterClrMapping/>
-  </p:clrMapOvr>
-  <p:transition spd="slow">
-    <p:push/>
-  </p:transition>
-  <p:timing>
-    <p:tnLst>
-      <p:par>
-        <p:cTn id="1" dur="indefinite" restart="never" nodeType="tmRoot">
-          <p:childTnLst>
-            <p:seq concurrent="1" nextAc="seek">
-              <p:cTn id="2" dur="indefinite" nodeType="mainSeq">
-                <p:childTnLst>
-                  <p:par>
-                    <p:cTn id="3" fill="hold">
-                      <p:stCondLst>
-                        <p:cond delay="indefinite"/>
-                        <p:cond evt="onBegin" delay="0">
-                          <p:tn val="2"/>
-                        </p:cond>
-                      </p:stCondLst>
-                      <p:childTnLst>
-                        <p:par>
-                          <p:cTn id="4" fill="hold">
-                            <p:stCondLst>
-                              <p:cond delay="0"/>
-                            </p:stCondLst>
-                            <p:childTnLst>
-                              <p:par>
-                                <p:cTn id="5" presetID="10" presetClass="entr" presetSubtype="0" fill="hold" nodeType="withEffect">
-                                  <p:stCondLst>
-                                    <p:cond delay="0"/>
-                                  </p:stCondLst>
-                                  <p:childTnLst>
-                                    <p:set>
-                                      <p:cBhvr>
-                                        <p:cTn id="6" dur="1" fill="hold">
-                                          <p:stCondLst>
-                                            <p:cond delay="0"/>
-                                          </p:stCondLst>
-                                        </p:cTn>
-                                        <p:tgtEl>
-                                          <p:spTgt spid="365"/>
-                                        </p:tgtEl>
-                                        <p:attrNameLst>
-                                          <p:attrName>style.visibility</p:attrName>
-                                        </p:attrNameLst>
-                                      </p:cBhvr>
-                                      <p:to>
-                                        <p:strVal val="visible"/>
-                                      </p:to>
-                                    </p:set>
-                                    <p:animEffect transition="in" filter="fade">
-                                      <p:cBhvr>
-                                        <p:cTn id="7" dur="1000"/>
-                                        <p:tgtEl>
-                                          <p:spTgt spid="365"/>
-                                        </p:tgtEl>
-                                      </p:cBhvr>
-                                    </p:animEffect>
-                                  </p:childTnLst>
-                                </p:cTn>
-                              </p:par>
-                            </p:childTnLst>
-                          </p:cTn>
-                        </p:par>
-                      </p:childTnLst>
-                    </p:cTn>
-                  </p:par>
-                </p:childTnLst>
-              </p:cTn>
-              <p:prevCondLst>
-                <p:cond evt="onPrev" delay="0">
-                  <p:tgtEl>
-                    <p:sldTgt/>
-                  </p:tgtEl>
-                </p:cond>
-              </p:prevCondLst>
-              <p:nextCondLst>
-                <p:cond evt="onNext" delay="0">
-                  <p:tgtEl>
-                    <p:sldTgt/>
-                  </p:tgtEl>
-                </p:cond>
-              </p:nextCondLst>
-            </p:seq>
-          </p:childTnLst>
-        </p:cTn>
-      </p:par>
-    </p:tnLst>
-  </p:timing>
-</p:sld>
-</file>
-
-<file path=ppt/slides/slide30.xml><?xml version="1.0" encoding="utf-8"?>
+<file path=ppt/slides/slide29.xml><?xml version="1.0" encoding="utf-8"?>
 <p:sld xmlns:a="http://schemas.openxmlformats.org/drawingml/2006/main" xmlns:r="http://schemas.openxmlformats.org/officeDocument/2006/relationships" xmlns:p="http://schemas.openxmlformats.org/presentationml/2006/main">
   <p:cSld>
     <p:spTree>
@@ -27304,7 +26253,462 @@
 </p:sld>
 </file>
 
-<file path=ppt/slides/slide31.xml><?xml version="1.0" encoding="utf-8"?>
+<file path=ppt/slides/slide3.xml><?xml version="1.0" encoding="utf-8"?>
+<p:sld xmlns:a="http://schemas.openxmlformats.org/drawingml/2006/main" xmlns:r="http://schemas.openxmlformats.org/officeDocument/2006/relationships" xmlns:p="http://schemas.openxmlformats.org/presentationml/2006/main">
+  <p:cSld>
+    <p:bg>
+      <p:bgPr>
+        <a:blipFill>
+          <a:blip r:embed="rId3">
+            <a:alphaModFix/>
+          </a:blip>
+          <a:stretch>
+            <a:fillRect/>
+          </a:stretch>
+        </a:blipFill>
+        <a:effectLst/>
+      </p:bgPr>
+    </p:bg>
+    <p:spTree>
+      <p:nvGrpSpPr>
+        <p:cNvPr id="1" name="Shape 426"/>
+        <p:cNvGrpSpPr/>
+        <p:nvPr/>
+      </p:nvGrpSpPr>
+      <p:grpSpPr>
+        <a:xfrm>
+          <a:off x="0" y="0"/>
+          <a:ext cx="0" cy="0"/>
+          <a:chOff x="0" y="0"/>
+          <a:chExt cx="0" cy="0"/>
+        </a:xfrm>
+      </p:grpSpPr>
+      <p:sp>
+        <p:nvSpPr>
+          <p:cNvPr id="427" name="Google Shape;427;p58"/>
+          <p:cNvSpPr txBox="1">
+            <a:spLocks noGrp="1"/>
+          </p:cNvSpPr>
+          <p:nvPr>
+            <p:ph type="title"/>
+          </p:nvPr>
+        </p:nvSpPr>
+        <p:spPr>
+          <a:xfrm>
+            <a:off x="597311" y="859760"/>
+            <a:ext cx="5106034" cy="572700"/>
+          </a:xfrm>
+          <a:prstGeom prst="rect">
+            <a:avLst/>
+          </a:prstGeom>
+        </p:spPr>
+        <p:txBody>
+          <a:bodyPr spcFirstLastPara="1" wrap="square" lIns="91425" tIns="91425" rIns="91425" bIns="91425" anchor="t" anchorCtr="0">
+            <a:noAutofit/>
+          </a:bodyPr>
+          <a:lstStyle/>
+          <a:p>
+            <a:pPr marL="0" lvl="0" indent="0" algn="ctr" rtl="0">
+              <a:spcBef>
+                <a:spcPts val="0"/>
+              </a:spcBef>
+              <a:spcAft>
+                <a:spcPts val="0"/>
+              </a:spcAft>
+              <a:buNone/>
+            </a:pPr>
+            <a:r>
+              <a:rPr lang="en" sz="4400" b="1" dirty="0"/>
+              <a:t>INTRODUCCIÓN</a:t>
+            </a:r>
+            <a:endParaRPr sz="4400" b="1" dirty="0"/>
+          </a:p>
+        </p:txBody>
+      </p:sp>
+      <p:sp>
+        <p:nvSpPr>
+          <p:cNvPr id="365" name="Google Shape;365;p53"/>
+          <p:cNvSpPr txBox="1">
+            <a:spLocks/>
+          </p:cNvSpPr>
+          <p:nvPr/>
+        </p:nvSpPr>
+        <p:spPr>
+          <a:xfrm>
+            <a:off x="597311" y="2181498"/>
+            <a:ext cx="5106034" cy="1815892"/>
+          </a:xfrm>
+          <a:prstGeom prst="rect">
+            <a:avLst/>
+          </a:prstGeom>
+          <a:noFill/>
+          <a:ln>
+            <a:noFill/>
+          </a:ln>
+        </p:spPr>
+        <p:txBody>
+          <a:bodyPr spcFirstLastPara="1" wrap="square" lIns="91425" tIns="91425" rIns="91425" bIns="91425" anchor="t" anchorCtr="0">
+            <a:noAutofit/>
+          </a:bodyPr>
+          <a:lstStyle>
+            <a:defPPr marR="0" lvl="0" algn="l" rtl="0">
+              <a:lnSpc>
+                <a:spcPct val="100000"/>
+              </a:lnSpc>
+              <a:spcBef>
+                <a:spcPts val="0"/>
+              </a:spcBef>
+              <a:spcAft>
+                <a:spcPts val="0"/>
+              </a:spcAft>
+            </a:defPPr>
+            <a:lvl1pPr marL="457200" marR="0" lvl="0" indent="-342900" algn="ctr" rtl="0">
+              <a:lnSpc>
+                <a:spcPct val="100000"/>
+              </a:lnSpc>
+              <a:spcBef>
+                <a:spcPts val="0"/>
+              </a:spcBef>
+              <a:spcAft>
+                <a:spcPts val="0"/>
+              </a:spcAft>
+              <a:buClr>
+                <a:schemeClr val="dk2"/>
+              </a:buClr>
+              <a:buSzPts val="1800"/>
+              <a:buFont typeface="Montserrat Medium"/>
+              <a:buNone/>
+              <a:defRPr sz="1500" b="0" i="0" u="none" strike="noStrike" cap="none">
+                <a:solidFill>
+                  <a:schemeClr val="dk2"/>
+                </a:solidFill>
+                <a:latin typeface="Montserrat Medium"/>
+                <a:ea typeface="Montserrat Medium"/>
+                <a:cs typeface="Montserrat Medium"/>
+                <a:sym typeface="Montserrat Medium"/>
+              </a:defRPr>
+            </a:lvl1pPr>
+            <a:lvl2pPr marL="914400" marR="0" lvl="1" indent="-317500" algn="ctr" rtl="0">
+              <a:lnSpc>
+                <a:spcPct val="100000"/>
+              </a:lnSpc>
+              <a:spcBef>
+                <a:spcPts val="0"/>
+              </a:spcBef>
+              <a:spcAft>
+                <a:spcPts val="0"/>
+              </a:spcAft>
+              <a:buClr>
+                <a:schemeClr val="dk2"/>
+              </a:buClr>
+              <a:buSzPts val="1400"/>
+              <a:buFont typeface="Montserrat Medium"/>
+              <a:buNone/>
+              <a:defRPr sz="1400" b="0" i="0" u="none" strike="noStrike" cap="none">
+                <a:solidFill>
+                  <a:schemeClr val="dk2"/>
+                </a:solidFill>
+                <a:latin typeface="Montserrat Medium"/>
+                <a:ea typeface="Montserrat Medium"/>
+                <a:cs typeface="Montserrat Medium"/>
+                <a:sym typeface="Montserrat Medium"/>
+              </a:defRPr>
+            </a:lvl2pPr>
+            <a:lvl3pPr marL="1371600" marR="0" lvl="2" indent="-317500" algn="ctr" rtl="0">
+              <a:lnSpc>
+                <a:spcPct val="100000"/>
+              </a:lnSpc>
+              <a:spcBef>
+                <a:spcPts val="0"/>
+              </a:spcBef>
+              <a:spcAft>
+                <a:spcPts val="0"/>
+              </a:spcAft>
+              <a:buClr>
+                <a:schemeClr val="dk2"/>
+              </a:buClr>
+              <a:buSzPts val="1400"/>
+              <a:buFont typeface="Montserrat Medium"/>
+              <a:buNone/>
+              <a:defRPr sz="1400" b="0" i="0" u="none" strike="noStrike" cap="none">
+                <a:solidFill>
+                  <a:schemeClr val="dk2"/>
+                </a:solidFill>
+                <a:latin typeface="Montserrat Medium"/>
+                <a:ea typeface="Montserrat Medium"/>
+                <a:cs typeface="Montserrat Medium"/>
+                <a:sym typeface="Montserrat Medium"/>
+              </a:defRPr>
+            </a:lvl3pPr>
+            <a:lvl4pPr marL="1828800" marR="0" lvl="3" indent="-317500" algn="ctr" rtl="0">
+              <a:lnSpc>
+                <a:spcPct val="100000"/>
+              </a:lnSpc>
+              <a:spcBef>
+                <a:spcPts val="0"/>
+              </a:spcBef>
+              <a:spcAft>
+                <a:spcPts val="0"/>
+              </a:spcAft>
+              <a:buClr>
+                <a:schemeClr val="dk2"/>
+              </a:buClr>
+              <a:buSzPts val="1400"/>
+              <a:buFont typeface="Montserrat Medium"/>
+              <a:buNone/>
+              <a:defRPr sz="1400" b="0" i="0" u="none" strike="noStrike" cap="none">
+                <a:solidFill>
+                  <a:schemeClr val="dk2"/>
+                </a:solidFill>
+                <a:latin typeface="Montserrat Medium"/>
+                <a:ea typeface="Montserrat Medium"/>
+                <a:cs typeface="Montserrat Medium"/>
+                <a:sym typeface="Montserrat Medium"/>
+              </a:defRPr>
+            </a:lvl4pPr>
+            <a:lvl5pPr marL="2286000" marR="0" lvl="4" indent="-317500" algn="ctr" rtl="0">
+              <a:lnSpc>
+                <a:spcPct val="100000"/>
+              </a:lnSpc>
+              <a:spcBef>
+                <a:spcPts val="0"/>
+              </a:spcBef>
+              <a:spcAft>
+                <a:spcPts val="0"/>
+              </a:spcAft>
+              <a:buClr>
+                <a:schemeClr val="dk2"/>
+              </a:buClr>
+              <a:buSzPts val="1400"/>
+              <a:buFont typeface="Montserrat Medium"/>
+              <a:buNone/>
+              <a:defRPr sz="1400" b="0" i="0" u="none" strike="noStrike" cap="none">
+                <a:solidFill>
+                  <a:schemeClr val="dk2"/>
+                </a:solidFill>
+                <a:latin typeface="Montserrat Medium"/>
+                <a:ea typeface="Montserrat Medium"/>
+                <a:cs typeface="Montserrat Medium"/>
+                <a:sym typeface="Montserrat Medium"/>
+              </a:defRPr>
+            </a:lvl5pPr>
+            <a:lvl6pPr marL="2743200" marR="0" lvl="5" indent="-317500" algn="ctr" rtl="0">
+              <a:lnSpc>
+                <a:spcPct val="100000"/>
+              </a:lnSpc>
+              <a:spcBef>
+                <a:spcPts val="0"/>
+              </a:spcBef>
+              <a:spcAft>
+                <a:spcPts val="0"/>
+              </a:spcAft>
+              <a:buClr>
+                <a:schemeClr val="dk2"/>
+              </a:buClr>
+              <a:buSzPts val="1400"/>
+              <a:buFont typeface="Montserrat Medium"/>
+              <a:buNone/>
+              <a:defRPr sz="1400" b="0" i="0" u="none" strike="noStrike" cap="none">
+                <a:solidFill>
+                  <a:schemeClr val="dk2"/>
+                </a:solidFill>
+                <a:latin typeface="Montserrat Medium"/>
+                <a:ea typeface="Montserrat Medium"/>
+                <a:cs typeface="Montserrat Medium"/>
+                <a:sym typeface="Montserrat Medium"/>
+              </a:defRPr>
+            </a:lvl6pPr>
+            <a:lvl7pPr marL="3200400" marR="0" lvl="6" indent="-317500" algn="ctr" rtl="0">
+              <a:lnSpc>
+                <a:spcPct val="100000"/>
+              </a:lnSpc>
+              <a:spcBef>
+                <a:spcPts val="0"/>
+              </a:spcBef>
+              <a:spcAft>
+                <a:spcPts val="0"/>
+              </a:spcAft>
+              <a:buClr>
+                <a:schemeClr val="dk2"/>
+              </a:buClr>
+              <a:buSzPts val="1400"/>
+              <a:buFont typeface="Montserrat Medium"/>
+              <a:buNone/>
+              <a:defRPr sz="1400" b="0" i="0" u="none" strike="noStrike" cap="none">
+                <a:solidFill>
+                  <a:schemeClr val="dk2"/>
+                </a:solidFill>
+                <a:latin typeface="Montserrat Medium"/>
+                <a:ea typeface="Montserrat Medium"/>
+                <a:cs typeface="Montserrat Medium"/>
+                <a:sym typeface="Montserrat Medium"/>
+              </a:defRPr>
+            </a:lvl7pPr>
+            <a:lvl8pPr marL="3657600" marR="0" lvl="7" indent="-317500" algn="ctr" rtl="0">
+              <a:lnSpc>
+                <a:spcPct val="100000"/>
+              </a:lnSpc>
+              <a:spcBef>
+                <a:spcPts val="0"/>
+              </a:spcBef>
+              <a:spcAft>
+                <a:spcPts val="0"/>
+              </a:spcAft>
+              <a:buClr>
+                <a:schemeClr val="dk2"/>
+              </a:buClr>
+              <a:buSzPts val="1400"/>
+              <a:buFont typeface="Montserrat Medium"/>
+              <a:buNone/>
+              <a:defRPr sz="1400" b="0" i="0" u="none" strike="noStrike" cap="none">
+                <a:solidFill>
+                  <a:schemeClr val="dk2"/>
+                </a:solidFill>
+                <a:latin typeface="Montserrat Medium"/>
+                <a:ea typeface="Montserrat Medium"/>
+                <a:cs typeface="Montserrat Medium"/>
+                <a:sym typeface="Montserrat Medium"/>
+              </a:defRPr>
+            </a:lvl8pPr>
+            <a:lvl9pPr marL="4114800" marR="0" lvl="8" indent="-317500" algn="ctr" rtl="0">
+              <a:lnSpc>
+                <a:spcPct val="100000"/>
+              </a:lnSpc>
+              <a:spcBef>
+                <a:spcPts val="0"/>
+              </a:spcBef>
+              <a:spcAft>
+                <a:spcPts val="0"/>
+              </a:spcAft>
+              <a:buClr>
+                <a:schemeClr val="dk2"/>
+              </a:buClr>
+              <a:buSzPts val="1400"/>
+              <a:buFont typeface="Montserrat Medium"/>
+              <a:buNone/>
+              <a:defRPr sz="1400" b="0" i="0" u="none" strike="noStrike" cap="none">
+                <a:solidFill>
+                  <a:schemeClr val="dk2"/>
+                </a:solidFill>
+                <a:latin typeface="Montserrat Medium"/>
+                <a:ea typeface="Montserrat Medium"/>
+                <a:cs typeface="Montserrat Medium"/>
+                <a:sym typeface="Montserrat Medium"/>
+              </a:defRPr>
+            </a:lvl9pPr>
+          </a:lstStyle>
+          <a:p>
+            <a:pPr algn="just"/>
+            <a:r>
+              <a:rPr lang="es-SV" sz="1600" dirty="0"/>
+              <a:t>En el presente trabajo se aborda la gestión, la búsqueda y los registros de documentos escaneados del bufete de abogados Cartagena, como un panorama actual de la tecnología de la información, donde la gestión eficiente de documentos se ha convertido en un tema de gran importancia.</a:t>
+            </a:r>
+          </a:p>
+        </p:txBody>
+      </p:sp>
+    </p:spTree>
+    <p:extLst>
+      <p:ext uri="{BB962C8B-B14F-4D97-AF65-F5344CB8AC3E}">
+        <p14:creationId xmlns:p14="http://schemas.microsoft.com/office/powerpoint/2010/main" val="1716865091"/>
+      </p:ext>
+    </p:extLst>
+  </p:cSld>
+  <p:clrMapOvr>
+    <a:masterClrMapping/>
+  </p:clrMapOvr>
+  <p:transition spd="slow">
+    <p:push/>
+  </p:transition>
+  <p:timing>
+    <p:tnLst>
+      <p:par>
+        <p:cTn id="1" dur="indefinite" restart="never" nodeType="tmRoot">
+          <p:childTnLst>
+            <p:seq concurrent="1" nextAc="seek">
+              <p:cTn id="2" dur="indefinite" nodeType="mainSeq">
+                <p:childTnLst>
+                  <p:par>
+                    <p:cTn id="3" fill="hold">
+                      <p:stCondLst>
+                        <p:cond delay="indefinite"/>
+                        <p:cond evt="onBegin" delay="0">
+                          <p:tn val="2"/>
+                        </p:cond>
+                      </p:stCondLst>
+                      <p:childTnLst>
+                        <p:par>
+                          <p:cTn id="4" fill="hold">
+                            <p:stCondLst>
+                              <p:cond delay="0"/>
+                            </p:stCondLst>
+                            <p:childTnLst>
+                              <p:par>
+                                <p:cTn id="5" presetID="10" presetClass="entr" presetSubtype="0" fill="hold" nodeType="withEffect">
+                                  <p:stCondLst>
+                                    <p:cond delay="0"/>
+                                  </p:stCondLst>
+                                  <p:childTnLst>
+                                    <p:set>
+                                      <p:cBhvr>
+                                        <p:cTn id="6" dur="1" fill="hold">
+                                          <p:stCondLst>
+                                            <p:cond delay="0"/>
+                                          </p:stCondLst>
+                                        </p:cTn>
+                                        <p:tgtEl>
+                                          <p:spTgt spid="365"/>
+                                        </p:tgtEl>
+                                        <p:attrNameLst>
+                                          <p:attrName>style.visibility</p:attrName>
+                                        </p:attrNameLst>
+                                      </p:cBhvr>
+                                      <p:to>
+                                        <p:strVal val="visible"/>
+                                      </p:to>
+                                    </p:set>
+                                    <p:animEffect transition="in" filter="fade">
+                                      <p:cBhvr>
+                                        <p:cTn id="7" dur="1000"/>
+                                        <p:tgtEl>
+                                          <p:spTgt spid="365"/>
+                                        </p:tgtEl>
+                                      </p:cBhvr>
+                                    </p:animEffect>
+                                  </p:childTnLst>
+                                </p:cTn>
+                              </p:par>
+                            </p:childTnLst>
+                          </p:cTn>
+                        </p:par>
+                      </p:childTnLst>
+                    </p:cTn>
+                  </p:par>
+                </p:childTnLst>
+              </p:cTn>
+              <p:prevCondLst>
+                <p:cond evt="onPrev" delay="0">
+                  <p:tgtEl>
+                    <p:sldTgt/>
+                  </p:tgtEl>
+                </p:cond>
+              </p:prevCondLst>
+              <p:nextCondLst>
+                <p:cond evt="onNext" delay="0">
+                  <p:tgtEl>
+                    <p:sldTgt/>
+                  </p:tgtEl>
+                </p:cond>
+              </p:nextCondLst>
+            </p:seq>
+          </p:childTnLst>
+        </p:cTn>
+      </p:par>
+    </p:tnLst>
+  </p:timing>
+</p:sld>
+</file>
+
+<file path=ppt/slides/slide30.xml><?xml version="1.0" encoding="utf-8"?>
 <p:sld xmlns:a="http://schemas.openxmlformats.org/drawingml/2006/main" xmlns:r="http://schemas.openxmlformats.org/officeDocument/2006/relationships" xmlns:p="http://schemas.openxmlformats.org/presentationml/2006/main">
   <p:cSld>
     <p:bg>
@@ -27387,7 +26791,7 @@
         <p:push/>
       </p:transition>
     </mc:Choice>
-    <mc:Fallback xmlns:ahyp="http://schemas.microsoft.com/office/drawing/2018/hyperlinkcolor" xmlns:p15="http://schemas.microsoft.com/office/powerpoint/2012/main" xmlns:com="http://schemas.openxmlformats.org/drawingml/2006/compatibility" xmlns:pvml="urn:schemas-microsoft-com:office:powerpoint" xmlns:v="urn:schemas-microsoft-com:vml" xmlns:o="urn:schemas-microsoft-com:office:office" xmlns:dgm="http://schemas.openxmlformats.org/drawingml/2006/diagram" xmlns:c="http://schemas.openxmlformats.org/drawingml/2006/chart" xmlns:mv="urn:schemas-microsoft-com:mac:vml" xmlns="">
+    <mc:Fallback xmlns="" xmlns:mv="urn:schemas-microsoft-com:mac:vml" xmlns:c="http://schemas.openxmlformats.org/drawingml/2006/chart" xmlns:dgm="http://schemas.openxmlformats.org/drawingml/2006/diagram" xmlns:o="urn:schemas-microsoft-com:office:office" xmlns:v="urn:schemas-microsoft-com:vml" xmlns:pvml="urn:schemas-microsoft-com:office:powerpoint" xmlns:com="http://schemas.openxmlformats.org/drawingml/2006/compatibility" xmlns:p15="http://schemas.microsoft.com/office/powerpoint/2012/main" xmlns:ahyp="http://schemas.microsoft.com/office/drawing/2018/hyperlinkcolor">
       <p:transition spd="slow">
         <p:fade/>
       </p:transition>
@@ -29717,7 +29121,7 @@
         <p:push/>
       </p:transition>
     </mc:Choice>
-    <mc:Fallback xmlns:ahyp="http://schemas.microsoft.com/office/drawing/2018/hyperlinkcolor" xmlns:p15="http://schemas.microsoft.com/office/powerpoint/2012/main" xmlns:com="http://schemas.openxmlformats.org/drawingml/2006/compatibility" xmlns:pvml="urn:schemas-microsoft-com:office:powerpoint" xmlns:v="urn:schemas-microsoft-com:vml" xmlns:o="urn:schemas-microsoft-com:office:office" xmlns:dgm="http://schemas.openxmlformats.org/drawingml/2006/diagram" xmlns:c="http://schemas.openxmlformats.org/drawingml/2006/chart" xmlns:mv="urn:schemas-microsoft-com:mac:vml" xmlns="">
+    <mc:Fallback xmlns="" xmlns:mv="urn:schemas-microsoft-com:mac:vml" xmlns:c="http://schemas.openxmlformats.org/drawingml/2006/chart" xmlns:dgm="http://schemas.openxmlformats.org/drawingml/2006/diagram" xmlns:o="urn:schemas-microsoft-com:office:office" xmlns:v="urn:schemas-microsoft-com:vml" xmlns:pvml="urn:schemas-microsoft-com:office:powerpoint" xmlns:com="http://schemas.openxmlformats.org/drawingml/2006/compatibility" xmlns:p15="http://schemas.microsoft.com/office/powerpoint/2012/main" xmlns:ahyp="http://schemas.microsoft.com/office/drawing/2018/hyperlinkcolor">
       <p:transition spd="slow">
         <p:fade/>
       </p:transition>
@@ -29871,7 +29275,7 @@
         <p:push/>
       </p:transition>
     </mc:Choice>
-    <mc:Fallback xmlns:ahyp="http://schemas.microsoft.com/office/drawing/2018/hyperlinkcolor" xmlns:p15="http://schemas.microsoft.com/office/powerpoint/2012/main" xmlns:com="http://schemas.openxmlformats.org/drawingml/2006/compatibility" xmlns:pvml="urn:schemas-microsoft-com:office:powerpoint" xmlns:v="urn:schemas-microsoft-com:vml" xmlns:o="urn:schemas-microsoft-com:office:office" xmlns:dgm="http://schemas.openxmlformats.org/drawingml/2006/diagram" xmlns:c="http://schemas.openxmlformats.org/drawingml/2006/chart" xmlns:mv="urn:schemas-microsoft-com:mac:vml" xmlns="">
+    <mc:Fallback xmlns="" xmlns:mv="urn:schemas-microsoft-com:mac:vml" xmlns:c="http://schemas.openxmlformats.org/drawingml/2006/chart" xmlns:dgm="http://schemas.openxmlformats.org/drawingml/2006/diagram" xmlns:o="urn:schemas-microsoft-com:office:office" xmlns:v="urn:schemas-microsoft-com:vml" xmlns:pvml="urn:schemas-microsoft-com:office:powerpoint" xmlns:com="http://schemas.openxmlformats.org/drawingml/2006/compatibility" xmlns:p15="http://schemas.microsoft.com/office/powerpoint/2012/main" xmlns:ahyp="http://schemas.microsoft.com/office/drawing/2018/hyperlinkcolor">
       <p:transition spd="slow">
         <p:fade/>
       </p:transition>
@@ -30113,7 +29517,7 @@
         <p:push/>
       </p:transition>
     </mc:Choice>
-    <mc:Fallback xmlns:ahyp="http://schemas.microsoft.com/office/drawing/2018/hyperlinkcolor" xmlns:p15="http://schemas.microsoft.com/office/powerpoint/2012/main" xmlns:com="http://schemas.openxmlformats.org/drawingml/2006/compatibility" xmlns:pvml="urn:schemas-microsoft-com:office:powerpoint" xmlns:v="urn:schemas-microsoft-com:vml" xmlns:o="urn:schemas-microsoft-com:office:office" xmlns:dgm="http://schemas.openxmlformats.org/drawingml/2006/diagram" xmlns:c="http://schemas.openxmlformats.org/drawingml/2006/chart" xmlns:mv="urn:schemas-microsoft-com:mac:vml" xmlns="">
+    <mc:Fallback xmlns="" xmlns:mv="urn:schemas-microsoft-com:mac:vml" xmlns:c="http://schemas.openxmlformats.org/drawingml/2006/chart" xmlns:dgm="http://schemas.openxmlformats.org/drawingml/2006/diagram" xmlns:o="urn:schemas-microsoft-com:office:office" xmlns:v="urn:schemas-microsoft-com:vml" xmlns:pvml="urn:schemas-microsoft-com:office:powerpoint" xmlns:com="http://schemas.openxmlformats.org/drawingml/2006/compatibility" xmlns:p15="http://schemas.microsoft.com/office/powerpoint/2012/main" xmlns:ahyp="http://schemas.microsoft.com/office/drawing/2018/hyperlinkcolor">
       <p:transition spd="slow">
         <p:fade/>
       </p:transition>
@@ -31272,7 +30676,7 @@
         </p:nvSpPr>
         <p:spPr>
           <a:xfrm>
-            <a:off x="5977027" y="927110"/>
+            <a:off x="6010093" y="1021992"/>
             <a:ext cx="2017184" cy="307777"/>
           </a:xfrm>
           <a:prstGeom prst="rect">
@@ -31303,8 +30707,8 @@
         </p:nvSpPr>
         <p:spPr>
           <a:xfrm>
-            <a:off x="6568454" y="1275009"/>
-            <a:ext cx="2017184" cy="738664"/>
+            <a:off x="6611785" y="1433301"/>
+            <a:ext cx="1670978" cy="738664"/>
           </a:xfrm>
           <a:prstGeom prst="rect">
             <a:avLst/>
@@ -31321,7 +30725,7 @@
               <a:rPr lang="es-SV" dirty="0">
                 <a:latin typeface="Montserrat Medium" panose="00000600000000000000" pitchFamily="2" charset="0"/>
               </a:rPr>
-              <a:t>Poco o nulo conocimiento de procesos externos</a:t>
+              <a:t>Poco o nulo conocimiento de los procesos </a:t>
             </a:r>
           </a:p>
         </p:txBody>
@@ -31685,8 +31089,8 @@
         </p:nvSpPr>
         <p:spPr>
           <a:xfrm>
-            <a:off x="794774" y="1805849"/>
-            <a:ext cx="5643551" cy="2447174"/>
+            <a:off x="1106148" y="1902512"/>
+            <a:ext cx="5103266" cy="2447174"/>
           </a:xfrm>
           <a:prstGeom prst="rect">
             <a:avLst/>
@@ -31698,12 +31102,12 @@
           </a:bodyPr>
           <a:lstStyle/>
           <a:p>
-            <a:pPr marL="0" lvl="0" indent="0"/>
+            <a:pPr marL="0" lvl="0" indent="0" algn="just"/>
             <a:r>
               <a:rPr lang="es-ES" sz="2000" dirty="0"/>
-              <a:t>¿Qué impacto tiene la utilización de una plataforma web que gestione documentos para optimizar el proceso de búsqueda de archivos en un bufete de abogados?</a:t>
+              <a:t>¿Qué impacto económico, ambiental e industrial tiene la utilización de una plataforma web que gestione documentos para optimizar el proceso de búsqueda de archivos en un bufete de abogados?</a:t>
             </a:r>
-            <a:endParaRPr sz="2000" dirty="0"/>
+            <a:endParaRPr sz="3200" dirty="0"/>
           </a:p>
         </p:txBody>
       </p:sp>
@@ -31785,7 +31189,7 @@
         <p:push/>
       </p:transition>
     </mc:Choice>
-    <mc:Fallback xmlns:ahyp="http://schemas.microsoft.com/office/drawing/2018/hyperlinkcolor" xmlns:p15="http://schemas.microsoft.com/office/powerpoint/2012/main" xmlns:com="http://schemas.openxmlformats.org/drawingml/2006/compatibility" xmlns:pvml="urn:schemas-microsoft-com:office:powerpoint" xmlns:v="urn:schemas-microsoft-com:vml" xmlns:o="urn:schemas-microsoft-com:office:office" xmlns:dgm="http://schemas.openxmlformats.org/drawingml/2006/diagram" xmlns:c="http://schemas.openxmlformats.org/drawingml/2006/chart" xmlns:mv="urn:schemas-microsoft-com:mac:vml" xmlns="">
+    <mc:Fallback xmlns="" xmlns:mv="urn:schemas-microsoft-com:mac:vml" xmlns:c="http://schemas.openxmlformats.org/drawingml/2006/chart" xmlns:dgm="http://schemas.openxmlformats.org/drawingml/2006/diagram" xmlns:o="urn:schemas-microsoft-com:office:office" xmlns:v="urn:schemas-microsoft-com:vml" xmlns:pvml="urn:schemas-microsoft-com:office:powerpoint" xmlns:com="http://schemas.openxmlformats.org/drawingml/2006/compatibility" xmlns:p15="http://schemas.microsoft.com/office/powerpoint/2012/main" xmlns:ahyp="http://schemas.microsoft.com/office/drawing/2018/hyperlinkcolor">
       <p:transition spd="slow">
         <p:fade/>
       </p:transition>

</xml_diff>